<commit_message>
PPT JAVA Dev Web 27Maio2022 MVC OOs
</commit_message>
<xml_diff>
--- a/01 Classes/Aula 01. 2 Desenvolvimento de Software  Java - Estilos Arquiteturais Padrões de Projetos OO e UML.pptx
+++ b/01 Classes/Aula 01. 2 Desenvolvimento de Software  Java - Estilos Arquiteturais Padrões de Projetos OO e UML.pptx
@@ -5,7 +5,7 @@
     <p:sldMasterId id="2147483648" r:id="rId1"/>
   </p:sldMasterIdLst>
   <p:notesMasterIdLst>
-    <p:notesMasterId r:id="rId20"/>
+    <p:notesMasterId r:id="rId21"/>
   </p:notesMasterIdLst>
   <p:sldIdLst>
     <p:sldId id="256" r:id="rId2"/>
@@ -15,17 +15,18 @@
     <p:sldId id="463" r:id="rId6"/>
     <p:sldId id="465" r:id="rId7"/>
     <p:sldId id="462" r:id="rId8"/>
-    <p:sldId id="461" r:id="rId9"/>
-    <p:sldId id="470" r:id="rId10"/>
-    <p:sldId id="468" r:id="rId11"/>
-    <p:sldId id="469" r:id="rId12"/>
-    <p:sldId id="466" r:id="rId13"/>
-    <p:sldId id="467" r:id="rId14"/>
-    <p:sldId id="333" r:id="rId15"/>
-    <p:sldId id="323" r:id="rId16"/>
-    <p:sldId id="334" r:id="rId17"/>
-    <p:sldId id="337" r:id="rId18"/>
-    <p:sldId id="309" r:id="rId19"/>
+    <p:sldId id="472" r:id="rId9"/>
+    <p:sldId id="461" r:id="rId10"/>
+    <p:sldId id="470" r:id="rId11"/>
+    <p:sldId id="468" r:id="rId12"/>
+    <p:sldId id="469" r:id="rId13"/>
+    <p:sldId id="466" r:id="rId14"/>
+    <p:sldId id="467" r:id="rId15"/>
+    <p:sldId id="333" r:id="rId16"/>
+    <p:sldId id="323" r:id="rId17"/>
+    <p:sldId id="334" r:id="rId18"/>
+    <p:sldId id="337" r:id="rId19"/>
+    <p:sldId id="309" r:id="rId20"/>
   </p:sldIdLst>
   <p:sldSz cx="9144000" cy="5143500" type="screen16x9"/>
   <p:notesSz cx="6858000" cy="9144000"/>
@@ -633,7 +634,7 @@
     </p:spTree>
     <p:extLst>
       <p:ext uri="{BB962C8B-B14F-4D97-AF65-F5344CB8AC3E}">
-        <p14:creationId xmlns:p14="http://schemas.microsoft.com/office/powerpoint/2010/main" val="2277951489"/>
+        <p14:creationId xmlns:p14="http://schemas.microsoft.com/office/powerpoint/2010/main" val="49392551"/>
       </p:ext>
     </p:extLst>
   </p:cSld>
@@ -699,7 +700,7 @@
     </p:spTree>
     <p:extLst>
       <p:ext uri="{BB962C8B-B14F-4D97-AF65-F5344CB8AC3E}">
-        <p14:creationId xmlns:p14="http://schemas.microsoft.com/office/powerpoint/2010/main" val="2973005078"/>
+        <p14:creationId xmlns:p14="http://schemas.microsoft.com/office/powerpoint/2010/main" val="2277951489"/>
       </p:ext>
     </p:extLst>
   </p:cSld>
@@ -765,7 +766,7 @@
     </p:spTree>
     <p:extLst>
       <p:ext uri="{BB962C8B-B14F-4D97-AF65-F5344CB8AC3E}">
-        <p14:creationId xmlns:p14="http://schemas.microsoft.com/office/powerpoint/2010/main" val="585304384"/>
+        <p14:creationId xmlns:p14="http://schemas.microsoft.com/office/powerpoint/2010/main" val="2973005078"/>
       </p:ext>
     </p:extLst>
   </p:cSld>
@@ -831,7 +832,7 @@
     </p:spTree>
     <p:extLst>
       <p:ext uri="{BB962C8B-B14F-4D97-AF65-F5344CB8AC3E}">
-        <p14:creationId xmlns:p14="http://schemas.microsoft.com/office/powerpoint/2010/main" val="2709569597"/>
+        <p14:creationId xmlns:p14="http://schemas.microsoft.com/office/powerpoint/2010/main" val="585304384"/>
       </p:ext>
     </p:extLst>
   </p:cSld>
@@ -897,6 +898,72 @@
     </p:spTree>
     <p:extLst>
       <p:ext uri="{BB962C8B-B14F-4D97-AF65-F5344CB8AC3E}">
+        <p14:creationId xmlns:p14="http://schemas.microsoft.com/office/powerpoint/2010/main" val="2709569597"/>
+      </p:ext>
+    </p:extLst>
+  </p:cSld>
+  <p:clrMapOvr>
+    <a:masterClrMapping/>
+  </p:clrMapOvr>
+</p:notes>
+</file>
+
+<file path=ppt/notesSlides/notesSlide15.xml><?xml version="1.0" encoding="utf-8"?>
+<p:notes xmlns:a="http://schemas.openxmlformats.org/drawingml/2006/main" xmlns:r="http://schemas.openxmlformats.org/officeDocument/2006/relationships" xmlns:p="http://schemas.openxmlformats.org/presentationml/2006/main">
+  <p:cSld>
+    <p:spTree>
+      <p:nvGrpSpPr>
+        <p:cNvPr id="1" name=""/>
+        <p:cNvGrpSpPr/>
+        <p:nvPr/>
+      </p:nvGrpSpPr>
+      <p:grpSpPr>
+        <a:xfrm>
+          <a:off x="0" y="0"/>
+          <a:ext cx="0" cy="0"/>
+          <a:chOff x="0" y="0"/>
+          <a:chExt cx="0" cy="0"/>
+        </a:xfrm>
+      </p:grpSpPr>
+      <p:sp>
+        <p:nvSpPr>
+          <p:cNvPr id="2" name="Espaço Reservado para Imagem de Slide 1"/>
+          <p:cNvSpPr>
+            <a:spLocks noGrp="1" noRot="1" noChangeAspect="1"/>
+          </p:cNvSpPr>
+          <p:nvPr>
+            <p:ph type="sldImg"/>
+          </p:nvPr>
+        </p:nvSpPr>
+        <p:spPr>
+          <a:xfrm>
+            <a:off x="381000" y="685800"/>
+            <a:ext cx="6096000" cy="3429000"/>
+          </a:xfrm>
+        </p:spPr>
+      </p:sp>
+      <p:sp>
+        <p:nvSpPr>
+          <p:cNvPr id="3" name="Espaço Reservado para Anotações 2"/>
+          <p:cNvSpPr>
+            <a:spLocks noGrp="1"/>
+          </p:cNvSpPr>
+          <p:nvPr>
+            <p:ph type="body" idx="1"/>
+          </p:nvPr>
+        </p:nvSpPr>
+        <p:spPr/>
+        <p:txBody>
+          <a:bodyPr/>
+          <a:lstStyle/>
+          <a:p>
+            <a:endParaRPr lang="pt-BR" dirty="0"/>
+          </a:p>
+        </p:txBody>
+      </p:sp>
+    </p:spTree>
+    <p:extLst>
+      <p:ext uri="{BB962C8B-B14F-4D97-AF65-F5344CB8AC3E}">
         <p14:creationId xmlns:p14="http://schemas.microsoft.com/office/powerpoint/2010/main" val="2296249050"/>
       </p:ext>
     </p:extLst>
@@ -907,7 +974,7 @@
 </p:notes>
 </file>
 
-<file path=ppt/notesSlides/notesSlide15.xml><?xml version="1.0" encoding="utf-8"?>
+<file path=ppt/notesSlides/notesSlide16.xml><?xml version="1.0" encoding="utf-8"?>
 <p:notes xmlns:a="http://schemas.openxmlformats.org/drawingml/2006/main" xmlns:r="http://schemas.openxmlformats.org/officeDocument/2006/relationships" xmlns:p="http://schemas.openxmlformats.org/presentationml/2006/main">
   <p:cSld>
     <p:spTree>
@@ -1293,7 +1360,7 @@
     </p:spTree>
     <p:extLst>
       <p:ext uri="{BB962C8B-B14F-4D97-AF65-F5344CB8AC3E}">
-        <p14:creationId xmlns:p14="http://schemas.microsoft.com/office/powerpoint/2010/main" val="2394320161"/>
+        <p14:creationId xmlns:p14="http://schemas.microsoft.com/office/powerpoint/2010/main" val="3021117740"/>
       </p:ext>
     </p:extLst>
   </p:cSld>
@@ -1359,7 +1426,7 @@
     </p:spTree>
     <p:extLst>
       <p:ext uri="{BB962C8B-B14F-4D97-AF65-F5344CB8AC3E}">
-        <p14:creationId xmlns:p14="http://schemas.microsoft.com/office/powerpoint/2010/main" val="834424441"/>
+        <p14:creationId xmlns:p14="http://schemas.microsoft.com/office/powerpoint/2010/main" val="2394320161"/>
       </p:ext>
     </p:extLst>
   </p:cSld>
@@ -1425,7 +1492,7 @@
     </p:spTree>
     <p:extLst>
       <p:ext uri="{BB962C8B-B14F-4D97-AF65-F5344CB8AC3E}">
-        <p14:creationId xmlns:p14="http://schemas.microsoft.com/office/powerpoint/2010/main" val="3699309899"/>
+        <p14:creationId xmlns:p14="http://schemas.microsoft.com/office/powerpoint/2010/main" val="834424441"/>
       </p:ext>
     </p:extLst>
   </p:cSld>
@@ -1491,7 +1558,7 @@
     </p:spTree>
     <p:extLst>
       <p:ext uri="{BB962C8B-B14F-4D97-AF65-F5344CB8AC3E}">
-        <p14:creationId xmlns:p14="http://schemas.microsoft.com/office/powerpoint/2010/main" val="49392551"/>
+        <p14:creationId xmlns:p14="http://schemas.microsoft.com/office/powerpoint/2010/main" val="3699309899"/>
       </p:ext>
     </p:extLst>
   </p:cSld>
@@ -4327,7 +4394,7 @@
                   <a:srgbClr val="0070C0"/>
                 </a:solidFill>
               </a:rPr>
-              <a:t>JAVA – DER</a:t>
+              <a:t>JAVA – OO</a:t>
             </a:r>
           </a:p>
         </p:txBody>
@@ -4344,8 +4411,8 @@
         </p:nvSpPr>
         <p:spPr>
           <a:xfrm>
-            <a:off x="142865" y="1037312"/>
-            <a:ext cx="8865056" cy="3900208"/>
+            <a:off x="142865" y="1037311"/>
+            <a:ext cx="8865056" cy="4023203"/>
           </a:xfrm>
         </p:spPr>
         <p:txBody>
@@ -4354,45 +4421,47 @@
           </a:bodyPr>
           <a:lstStyle/>
           <a:p>
-            <a:pPr marL="0" indent="0" algn="just">
-              <a:buNone/>
+            <a:pPr algn="just">
+              <a:buFont typeface="Wingdings" panose="05000000000000000000" pitchFamily="2" charset="2"/>
+              <a:buChar char="§"/>
             </a:pPr>
             <a:r>
-              <a:rPr lang="pt-BR" sz="2000" dirty="0">
-                <a:solidFill>
-                  <a:schemeClr val="tx1"/>
-                </a:solidFill>
-                <a:latin typeface="Times New Roman" panose="02020603050405020304" pitchFamily="18" charset="0"/>
-                <a:cs typeface="Times New Roman" panose="02020603050405020304" pitchFamily="18" charset="0"/>
-              </a:rPr>
-              <a:t>O </a:t>
-            </a:r>
-            <a:r>
-              <a:rPr lang="pt-BR" sz="2000" b="1" dirty="0">
-                <a:solidFill>
-                  <a:srgbClr val="FF0000"/>
-                </a:solidFill>
-                <a:latin typeface="Times New Roman" panose="02020603050405020304" pitchFamily="18" charset="0"/>
-                <a:cs typeface="Times New Roman" panose="02020603050405020304" pitchFamily="18" charset="0"/>
-              </a:rPr>
-              <a:t>DER</a:t>
-            </a:r>
-            <a:r>
-              <a:rPr lang="pt-BR" sz="2000" dirty="0">
-                <a:solidFill>
-                  <a:schemeClr val="tx1"/>
-                </a:solidFill>
-                <a:latin typeface="Times New Roman" panose="02020603050405020304" pitchFamily="18" charset="0"/>
-                <a:cs typeface="Times New Roman" panose="02020603050405020304" pitchFamily="18" charset="0"/>
-              </a:rPr>
-              <a:t> é a representação gráfica do domínio  de um projeto de software, dentro da modelagem clássica relacional.</a:t>
-            </a:r>
-          </a:p>
-          <a:p>
-            <a:pPr marL="0" indent="0" algn="just">
-              <a:buNone/>
+              <a:rPr lang="pt-BR" sz="2400" dirty="0" err="1">
+                <a:solidFill>
+                  <a:schemeClr val="tx1"/>
+                </a:solidFill>
+                <a:latin typeface="Times New Roman" panose="02020603050405020304" pitchFamily="18" charset="0"/>
+                <a:cs typeface="Times New Roman" panose="02020603050405020304" pitchFamily="18" charset="0"/>
+              </a:rPr>
+              <a:t>Class</a:t>
+            </a:r>
+            <a:r>
+              <a:rPr lang="pt-BR" sz="2400" dirty="0">
+                <a:solidFill>
+                  <a:schemeClr val="tx1"/>
+                </a:solidFill>
+                <a:latin typeface="Times New Roman" panose="02020603050405020304" pitchFamily="18" charset="0"/>
+                <a:cs typeface="Times New Roman" panose="02020603050405020304" pitchFamily="18" charset="0"/>
+              </a:rPr>
+              <a:t> (Abstração)</a:t>
+            </a:r>
+          </a:p>
+          <a:p>
+            <a:pPr lvl="1" algn="just">
+              <a:buFont typeface="Arial" panose="020B0604020202020204" pitchFamily="34" charset="0"/>
+              <a:buChar char="•"/>
             </a:pPr>
-            <a:endParaRPr lang="pt-BR" sz="2000" dirty="0">
+            <a:r>
+              <a:rPr lang="pt-BR" sz="2400" dirty="0" err="1">
+                <a:solidFill>
+                  <a:schemeClr val="tx1"/>
+                </a:solidFill>
+                <a:latin typeface="Times New Roman" panose="02020603050405020304" pitchFamily="18" charset="0"/>
+                <a:cs typeface="Times New Roman" panose="02020603050405020304" pitchFamily="18" charset="0"/>
+              </a:rPr>
+              <a:t>Constructor</a:t>
+            </a:r>
+            <a:endParaRPr lang="pt-BR" sz="2400" dirty="0">
               <a:solidFill>
                 <a:schemeClr val="tx1"/>
               </a:solidFill>
@@ -4401,20 +4470,31 @@
             </a:endParaRPr>
           </a:p>
           <a:p>
-            <a:pPr marL="0" indent="0" algn="just">
-              <a:buNone/>
+            <a:pPr lvl="1" algn="just">
+              <a:buFont typeface="Arial" panose="020B0604020202020204" pitchFamily="34" charset="0"/>
+              <a:buChar char="•"/>
             </a:pPr>
             <a:r>
-              <a:rPr lang="pt-BR" sz="2000" b="1" dirty="0">
-                <a:solidFill>
-                  <a:schemeClr val="tx1"/>
-                </a:solidFill>
-                <a:latin typeface="Times New Roman" panose="02020603050405020304" pitchFamily="18" charset="0"/>
-                <a:cs typeface="Times New Roman" panose="02020603050405020304" pitchFamily="18" charset="0"/>
-              </a:rPr>
-              <a:t>Alguns Documentos de Projeto</a:t>
-            </a:r>
-            <a:endParaRPr lang="pt-BR" sz="2000" dirty="0">
+              <a:rPr lang="pt-BR" sz="2400" dirty="0">
+                <a:solidFill>
+                  <a:schemeClr val="tx1"/>
+                </a:solidFill>
+                <a:latin typeface="Times New Roman" panose="02020603050405020304" pitchFamily="18" charset="0"/>
+                <a:cs typeface="Times New Roman" panose="02020603050405020304" pitchFamily="18" charset="0"/>
+              </a:rPr>
+              <a:t>Atributes/</a:t>
+            </a:r>
+            <a:r>
+              <a:rPr lang="pt-BR" sz="2400" dirty="0" err="1">
+                <a:solidFill>
+                  <a:schemeClr val="tx1"/>
+                </a:solidFill>
+                <a:latin typeface="Times New Roman" panose="02020603050405020304" pitchFamily="18" charset="0"/>
+                <a:cs typeface="Times New Roman" panose="02020603050405020304" pitchFamily="18" charset="0"/>
+              </a:rPr>
+              <a:t>Properties</a:t>
+            </a:r>
+            <a:endParaRPr lang="pt-BR" sz="2400" dirty="0">
               <a:solidFill>
                 <a:schemeClr val="tx1"/>
               </a:solidFill>
@@ -4423,88 +4503,21 @@
             </a:endParaRPr>
           </a:p>
           <a:p>
-            <a:pPr algn="just">
-              <a:buFont typeface="Wingdings" panose="05000000000000000000" pitchFamily="2" charset="2"/>
-              <a:buChar char="ü"/>
+            <a:pPr lvl="1" algn="just">
+              <a:buFont typeface="Arial" panose="020B0604020202020204" pitchFamily="34" charset="0"/>
+              <a:buChar char="•"/>
             </a:pPr>
             <a:r>
-              <a:rPr lang="pt-BR" sz="2000" dirty="0">
-                <a:solidFill>
-                  <a:schemeClr val="tx1"/>
-                </a:solidFill>
-                <a:latin typeface="Times New Roman" panose="02020603050405020304" pitchFamily="18" charset="0"/>
-                <a:cs typeface="Times New Roman" panose="02020603050405020304" pitchFamily="18" charset="0"/>
-              </a:rPr>
-              <a:t>Projeto Técnico (</a:t>
-            </a:r>
-            <a:r>
-              <a:rPr lang="pt-BR" sz="2000" b="1" dirty="0">
-                <a:solidFill>
-                  <a:schemeClr val="tx1"/>
-                </a:solidFill>
-                <a:latin typeface="Times New Roman" panose="02020603050405020304" pitchFamily="18" charset="0"/>
-                <a:cs typeface="Times New Roman" panose="02020603050405020304" pitchFamily="18" charset="0"/>
-              </a:rPr>
-              <a:t>Negócio</a:t>
-            </a:r>
-            <a:r>
-              <a:rPr lang="pt-BR" sz="2000" dirty="0">
-                <a:solidFill>
-                  <a:schemeClr val="tx1"/>
-                </a:solidFill>
-                <a:latin typeface="Times New Roman" panose="02020603050405020304" pitchFamily="18" charset="0"/>
-                <a:cs typeface="Times New Roman" panose="02020603050405020304" pitchFamily="18" charset="0"/>
-              </a:rPr>
-              <a:t>); </a:t>
-            </a:r>
-          </a:p>
-          <a:p>
-            <a:pPr algn="just">
-              <a:buFont typeface="Wingdings" panose="05000000000000000000" pitchFamily="2" charset="2"/>
-              <a:buChar char="ü"/>
-            </a:pPr>
-            <a:r>
-              <a:rPr lang="pt-BR" sz="2000" dirty="0">
-                <a:solidFill>
-                  <a:schemeClr val="tx1"/>
-                </a:solidFill>
-                <a:latin typeface="Times New Roman" panose="02020603050405020304" pitchFamily="18" charset="0"/>
-                <a:cs typeface="Times New Roman" panose="02020603050405020304" pitchFamily="18" charset="0"/>
-              </a:rPr>
-              <a:t>Projeto Lógico; </a:t>
-            </a:r>
-          </a:p>
-          <a:p>
-            <a:pPr algn="just">
-              <a:buFont typeface="Wingdings" panose="05000000000000000000" pitchFamily="2" charset="2"/>
-              <a:buChar char="ü"/>
-            </a:pPr>
-            <a:r>
-              <a:rPr lang="pt-BR" sz="2000" dirty="0">
-                <a:solidFill>
-                  <a:schemeClr val="tx1"/>
-                </a:solidFill>
-                <a:latin typeface="Times New Roman" panose="02020603050405020304" pitchFamily="18" charset="0"/>
-                <a:cs typeface="Times New Roman" panose="02020603050405020304" pitchFamily="18" charset="0"/>
-              </a:rPr>
-              <a:t>Projeto Físico; </a:t>
-            </a:r>
-          </a:p>
-          <a:p>
-            <a:pPr marL="0" indent="0" algn="just">
-              <a:buNone/>
-            </a:pPr>
-            <a:r>
-              <a:rPr lang="pt-BR" sz="2000" b="1" dirty="0">
-                <a:solidFill>
-                  <a:schemeClr val="tx1"/>
-                </a:solidFill>
-                <a:latin typeface="Times New Roman" panose="02020603050405020304" pitchFamily="18" charset="0"/>
-                <a:cs typeface="Times New Roman" panose="02020603050405020304" pitchFamily="18" charset="0"/>
-              </a:rPr>
-              <a:t>Composição (Lógico/Físico)</a:t>
-            </a:r>
-            <a:endParaRPr lang="pt-BR" sz="2000" dirty="0">
+              <a:rPr lang="pt-BR" sz="2400" dirty="0" err="1">
+                <a:solidFill>
+                  <a:schemeClr val="tx1"/>
+                </a:solidFill>
+                <a:latin typeface="Times New Roman" panose="02020603050405020304" pitchFamily="18" charset="0"/>
+                <a:cs typeface="Times New Roman" panose="02020603050405020304" pitchFamily="18" charset="0"/>
+              </a:rPr>
+              <a:t>Methods</a:t>
+            </a:r>
+            <a:endParaRPr lang="pt-BR" sz="2400" dirty="0">
               <a:solidFill>
                 <a:schemeClr val="tx1"/>
               </a:solidFill>
@@ -4513,25 +4526,51 @@
             </a:endParaRPr>
           </a:p>
           <a:p>
-            <a:pPr marL="0" indent="0" algn="just">
-              <a:buNone/>
+            <a:pPr lvl="1" algn="just">
+              <a:buFont typeface="Arial" panose="020B0604020202020204" pitchFamily="34" charset="0"/>
+              <a:buChar char="•"/>
             </a:pPr>
             <a:r>
-              <a:rPr lang="pt-BR" sz="1800" dirty="0">
-                <a:solidFill>
-                  <a:schemeClr val="tx1"/>
-                </a:solidFill>
-                <a:latin typeface="Times New Roman" panose="02020603050405020304" pitchFamily="18" charset="0"/>
-                <a:cs typeface="Times New Roman" panose="02020603050405020304" pitchFamily="18" charset="0"/>
-              </a:rPr>
-              <a:t>Objetivo; Requisitos Funcionais; DER / DD / Diagrama de Contexto; DFD de Nível 0 e por Evento; Diagrama Comportamental; Especificação de Programas; Layouts</a:t>
-            </a:r>
-          </a:p>
-          <a:p>
-            <a:pPr marL="0" indent="0" algn="just">
-              <a:buNone/>
-            </a:pPr>
-            <a:endParaRPr lang="pt-BR" sz="2000" dirty="0">
+              <a:rPr lang="pt-BR" sz="2400" dirty="0">
+                <a:solidFill>
+                  <a:schemeClr val="tx1"/>
+                </a:solidFill>
+                <a:latin typeface="Times New Roman" panose="02020603050405020304" pitchFamily="18" charset="0"/>
+                <a:cs typeface="Times New Roman" panose="02020603050405020304" pitchFamily="18" charset="0"/>
+              </a:rPr>
+              <a:t>Níveis de Visibilidade: </a:t>
+            </a:r>
+            <a:r>
+              <a:rPr lang="pt-BR" sz="2400" dirty="0" err="1">
+                <a:solidFill>
+                  <a:schemeClr val="tx1"/>
+                </a:solidFill>
+                <a:latin typeface="Times New Roman" panose="02020603050405020304" pitchFamily="18" charset="0"/>
+                <a:cs typeface="Times New Roman" panose="02020603050405020304" pitchFamily="18" charset="0"/>
+              </a:rPr>
+              <a:t>Public</a:t>
+            </a:r>
+            <a:r>
+              <a:rPr lang="pt-BR" sz="2400" dirty="0">
+                <a:solidFill>
+                  <a:schemeClr val="tx1"/>
+                </a:solidFill>
+                <a:latin typeface="Times New Roman" panose="02020603050405020304" pitchFamily="18" charset="0"/>
+                <a:cs typeface="Times New Roman" panose="02020603050405020304" pitchFamily="18" charset="0"/>
+              </a:rPr>
+              <a:t>; Private; </a:t>
+            </a:r>
+            <a:r>
+              <a:rPr lang="pt-BR" sz="2400" dirty="0" err="1">
+                <a:solidFill>
+                  <a:schemeClr val="tx1"/>
+                </a:solidFill>
+                <a:latin typeface="Times New Roman" panose="02020603050405020304" pitchFamily="18" charset="0"/>
+                <a:cs typeface="Times New Roman" panose="02020603050405020304" pitchFamily="18" charset="0"/>
+              </a:rPr>
+              <a:t>Protected</a:t>
+            </a:r>
+            <a:endParaRPr lang="pt-BR" sz="2400" dirty="0">
               <a:solidFill>
                 <a:schemeClr val="tx1"/>
               </a:solidFill>
@@ -4540,10 +4579,21 @@
             </a:endParaRPr>
           </a:p>
           <a:p>
-            <a:pPr marL="0" indent="0" algn="just">
-              <a:buNone/>
+            <a:pPr algn="just">
+              <a:buFont typeface="Wingdings" panose="05000000000000000000" pitchFamily="2" charset="2"/>
+              <a:buChar char="§"/>
             </a:pPr>
-            <a:endParaRPr lang="pt-BR" sz="2000" dirty="0">
+            <a:r>
+              <a:rPr lang="pt-BR" sz="2400" dirty="0" err="1">
+                <a:solidFill>
+                  <a:schemeClr val="tx1"/>
+                </a:solidFill>
+                <a:latin typeface="Times New Roman" panose="02020603050405020304" pitchFamily="18" charset="0"/>
+                <a:cs typeface="Times New Roman" panose="02020603050405020304" pitchFamily="18" charset="0"/>
+              </a:rPr>
+              <a:t>Object</a:t>
+            </a:r>
+            <a:endParaRPr lang="pt-BR" sz="2400" dirty="0">
               <a:solidFill>
                 <a:schemeClr val="tx1"/>
               </a:solidFill>
@@ -4551,12 +4601,77 @@
               <a:cs typeface="Times New Roman" panose="02020603050405020304" pitchFamily="18" charset="0"/>
             </a:endParaRPr>
           </a:p>
+          <a:p>
+            <a:pPr algn="just">
+              <a:buFont typeface="Wingdings" panose="05000000000000000000" pitchFamily="2" charset="2"/>
+              <a:buChar char="§"/>
+            </a:pPr>
+            <a:r>
+              <a:rPr lang="pt-BR" sz="2400" dirty="0">
+                <a:solidFill>
+                  <a:schemeClr val="tx1"/>
+                </a:solidFill>
+                <a:latin typeface="Times New Roman" panose="02020603050405020304" pitchFamily="18" charset="0"/>
+                <a:cs typeface="Times New Roman" panose="02020603050405020304" pitchFamily="18" charset="0"/>
+              </a:rPr>
+              <a:t>Herança / </a:t>
+            </a:r>
+            <a:r>
+              <a:rPr lang="pt-BR" sz="2400" dirty="0" err="1">
+                <a:solidFill>
+                  <a:schemeClr val="tx1"/>
+                </a:solidFill>
+                <a:latin typeface="Times New Roman" panose="02020603050405020304" pitchFamily="18" charset="0"/>
+                <a:cs typeface="Times New Roman" panose="02020603050405020304" pitchFamily="18" charset="0"/>
+              </a:rPr>
+              <a:t>Extends</a:t>
+            </a:r>
+            <a:endParaRPr lang="pt-BR" sz="2400" dirty="0">
+              <a:solidFill>
+                <a:schemeClr val="tx1"/>
+              </a:solidFill>
+              <a:latin typeface="Times New Roman" panose="02020603050405020304" pitchFamily="18" charset="0"/>
+              <a:cs typeface="Times New Roman" panose="02020603050405020304" pitchFamily="18" charset="0"/>
+            </a:endParaRPr>
+          </a:p>
+          <a:p>
+            <a:pPr algn="just">
+              <a:buFont typeface="Wingdings" panose="05000000000000000000" pitchFamily="2" charset="2"/>
+              <a:buChar char="§"/>
+            </a:pPr>
+            <a:r>
+              <a:rPr lang="pt-BR" sz="2400" dirty="0">
+                <a:solidFill>
+                  <a:schemeClr val="tx1"/>
+                </a:solidFill>
+                <a:latin typeface="Times New Roman" panose="02020603050405020304" pitchFamily="18" charset="0"/>
+                <a:cs typeface="Times New Roman" panose="02020603050405020304" pitchFamily="18" charset="0"/>
+              </a:rPr>
+              <a:t>Encapsulamento</a:t>
+            </a:r>
+          </a:p>
+          <a:p>
+            <a:pPr algn="just">
+              <a:buFont typeface="Wingdings" panose="05000000000000000000" pitchFamily="2" charset="2"/>
+              <a:buChar char="§"/>
+            </a:pPr>
+            <a:r>
+              <a:rPr lang="pt-BR" sz="2400" dirty="0">
+                <a:solidFill>
+                  <a:schemeClr val="tx1"/>
+                </a:solidFill>
+                <a:latin typeface="Times New Roman" panose="02020603050405020304" pitchFamily="18" charset="0"/>
+                <a:cs typeface="Times New Roman" panose="02020603050405020304" pitchFamily="18" charset="0"/>
+              </a:rPr>
+              <a:t>Polimorfismo</a:t>
+            </a:r>
+          </a:p>
         </p:txBody>
       </p:sp>
     </p:spTree>
     <p:extLst>
       <p:ext uri="{BB962C8B-B14F-4D97-AF65-F5344CB8AC3E}">
-        <p14:creationId xmlns:p14="http://schemas.microsoft.com/office/powerpoint/2010/main" val="1890726142"/>
+        <p14:creationId xmlns:p14="http://schemas.microsoft.com/office/powerpoint/2010/main" val="1226275766"/>
       </p:ext>
     </p:extLst>
   </p:cSld>
@@ -4612,7 +4727,7 @@
                   <a:srgbClr val="0070C0"/>
                 </a:solidFill>
               </a:rPr>
-              <a:t>JAVA – UML</a:t>
+              <a:t>JAVA – DER</a:t>
             </a:r>
           </a:p>
         </p:txBody>
@@ -4643,101 +4758,41 @@
               <a:buNone/>
             </a:pPr>
             <a:r>
-              <a:rPr lang="pt-BR" sz="2400" dirty="0">
-                <a:solidFill>
-                  <a:schemeClr val="tx1"/>
-                </a:solidFill>
-                <a:latin typeface="Times New Roman" panose="02020603050405020304" pitchFamily="18" charset="0"/>
-                <a:cs typeface="Times New Roman" panose="02020603050405020304" pitchFamily="18" charset="0"/>
-              </a:rPr>
-              <a:t>A </a:t>
-            </a:r>
-            <a:r>
-              <a:rPr lang="pt-BR" sz="2400" b="1" dirty="0">
+              <a:rPr lang="pt-BR" sz="2000" dirty="0">
+                <a:solidFill>
+                  <a:schemeClr val="tx1"/>
+                </a:solidFill>
+                <a:latin typeface="Times New Roman" panose="02020603050405020304" pitchFamily="18" charset="0"/>
+                <a:cs typeface="Times New Roman" panose="02020603050405020304" pitchFamily="18" charset="0"/>
+              </a:rPr>
+              <a:t>O </a:t>
+            </a:r>
+            <a:r>
+              <a:rPr lang="pt-BR" sz="2000" b="1" dirty="0">
                 <a:solidFill>
                   <a:srgbClr val="FF0000"/>
                 </a:solidFill>
                 <a:latin typeface="Times New Roman" panose="02020603050405020304" pitchFamily="18" charset="0"/>
                 <a:cs typeface="Times New Roman" panose="02020603050405020304" pitchFamily="18" charset="0"/>
               </a:rPr>
-              <a:t>UML</a:t>
-            </a:r>
-            <a:r>
-              <a:rPr lang="pt-BR" sz="2400" dirty="0">
-                <a:solidFill>
-                  <a:schemeClr val="tx1"/>
-                </a:solidFill>
-                <a:latin typeface="Times New Roman" panose="02020603050405020304" pitchFamily="18" charset="0"/>
-                <a:cs typeface="Times New Roman" panose="02020603050405020304" pitchFamily="18" charset="0"/>
-              </a:rPr>
-              <a:t> (do inglês </a:t>
-            </a:r>
-            <a:r>
-              <a:rPr lang="pt-BR" sz="2400" dirty="0" err="1">
-                <a:solidFill>
-                  <a:schemeClr val="tx1"/>
-                </a:solidFill>
-                <a:latin typeface="Times New Roman" panose="02020603050405020304" pitchFamily="18" charset="0"/>
-                <a:cs typeface="Times New Roman" panose="02020603050405020304" pitchFamily="18" charset="0"/>
-              </a:rPr>
-              <a:t>Unified</a:t>
-            </a:r>
-            <a:r>
-              <a:rPr lang="pt-BR" sz="2400" dirty="0">
-                <a:solidFill>
-                  <a:schemeClr val="tx1"/>
-                </a:solidFill>
-                <a:latin typeface="Times New Roman" panose="02020603050405020304" pitchFamily="18" charset="0"/>
-                <a:cs typeface="Times New Roman" panose="02020603050405020304" pitchFamily="18" charset="0"/>
-              </a:rPr>
-              <a:t> </a:t>
-            </a:r>
-            <a:r>
-              <a:rPr lang="pt-BR" sz="2400" dirty="0" err="1">
-                <a:solidFill>
-                  <a:schemeClr val="tx1"/>
-                </a:solidFill>
-                <a:latin typeface="Times New Roman" panose="02020603050405020304" pitchFamily="18" charset="0"/>
-                <a:cs typeface="Times New Roman" panose="02020603050405020304" pitchFamily="18" charset="0"/>
-              </a:rPr>
-              <a:t>Modeling</a:t>
-            </a:r>
-            <a:r>
-              <a:rPr lang="pt-BR" sz="2400" dirty="0">
-                <a:solidFill>
-                  <a:schemeClr val="tx1"/>
-                </a:solidFill>
-                <a:latin typeface="Times New Roman" panose="02020603050405020304" pitchFamily="18" charset="0"/>
-                <a:cs typeface="Times New Roman" panose="02020603050405020304" pitchFamily="18" charset="0"/>
-              </a:rPr>
-              <a:t> </a:t>
-            </a:r>
-            <a:r>
-              <a:rPr lang="pt-BR" sz="2400" dirty="0" err="1">
-                <a:solidFill>
-                  <a:schemeClr val="tx1"/>
-                </a:solidFill>
-                <a:latin typeface="Times New Roman" panose="02020603050405020304" pitchFamily="18" charset="0"/>
-                <a:cs typeface="Times New Roman" panose="02020603050405020304" pitchFamily="18" charset="0"/>
-              </a:rPr>
-              <a:t>Language</a:t>
-            </a:r>
-            <a:r>
-              <a:rPr lang="pt-BR" sz="2400" dirty="0">
-                <a:solidFill>
-                  <a:schemeClr val="tx1"/>
-                </a:solidFill>
-                <a:latin typeface="Times New Roman" panose="02020603050405020304" pitchFamily="18" charset="0"/>
-                <a:cs typeface="Times New Roman" panose="02020603050405020304" pitchFamily="18" charset="0"/>
-              </a:rPr>
-              <a:t>), é uma linguagem-padrão para a elaboração da estrutura de projetos de software.</a:t>
+              <a:t>DER</a:t>
+            </a:r>
+            <a:r>
+              <a:rPr lang="pt-BR" sz="2000" dirty="0">
+                <a:solidFill>
+                  <a:schemeClr val="tx1"/>
+                </a:solidFill>
+                <a:latin typeface="Times New Roman" panose="02020603050405020304" pitchFamily="18" charset="0"/>
+                <a:cs typeface="Times New Roman" panose="02020603050405020304" pitchFamily="18" charset="0"/>
+              </a:rPr>
+              <a:t> é a representação gráfica do domínio  de um projeto de software, dentro da modelagem clássica relacional.</a:t>
             </a:r>
           </a:p>
           <a:p>
             <a:pPr marL="0" indent="0" algn="just">
               <a:buNone/>
             </a:pPr>
-            <a:endParaRPr lang="pt-BR" sz="2400" dirty="0">
+            <a:endParaRPr lang="pt-BR" sz="2000" dirty="0">
               <a:solidFill>
                 <a:schemeClr val="tx1"/>
               </a:solidFill>
@@ -4750,22 +4805,16 @@
               <a:buNone/>
             </a:pPr>
             <a:r>
-              <a:rPr lang="pt-BR" sz="2400" b="1" dirty="0">
-                <a:solidFill>
-                  <a:srgbClr val="FF0000"/>
-                </a:solidFill>
-                <a:latin typeface="Times New Roman" panose="02020603050405020304" pitchFamily="18" charset="0"/>
-                <a:cs typeface="Times New Roman" panose="02020603050405020304" pitchFamily="18" charset="0"/>
-              </a:rPr>
-              <a:t>Diagramas Estruturais</a:t>
-            </a:r>
-          </a:p>
-          <a:p>
-            <a:pPr algn="just">
-              <a:buFont typeface="Wingdings" panose="05000000000000000000" pitchFamily="2" charset="2"/>
-              <a:buChar char="ü"/>
-            </a:pPr>
-            <a:endParaRPr lang="pt-BR" sz="2400" dirty="0">
+              <a:rPr lang="pt-BR" sz="2000" b="1" dirty="0">
+                <a:solidFill>
+                  <a:schemeClr val="tx1"/>
+                </a:solidFill>
+                <a:latin typeface="Times New Roman" panose="02020603050405020304" pitchFamily="18" charset="0"/>
+                <a:cs typeface="Times New Roman" panose="02020603050405020304" pitchFamily="18" charset="0"/>
+              </a:rPr>
+              <a:t>Alguns Documentos de Projeto</a:t>
+            </a:r>
+            <a:endParaRPr lang="pt-BR" sz="2000" dirty="0">
               <a:solidFill>
                 <a:schemeClr val="tx1"/>
               </a:solidFill>
@@ -4779,14 +4828,34 @@
               <a:buChar char="ü"/>
             </a:pPr>
             <a:r>
-              <a:rPr lang="pt-BR" sz="2400" dirty="0">
-                <a:solidFill>
-                  <a:schemeClr val="tx1"/>
-                </a:solidFill>
-                <a:latin typeface="Times New Roman" panose="02020603050405020304" pitchFamily="18" charset="0"/>
-                <a:cs typeface="Times New Roman" panose="02020603050405020304" pitchFamily="18" charset="0"/>
-              </a:rPr>
-              <a:t>Diagrama de Classes / Entidades</a:t>
+              <a:rPr lang="pt-BR" sz="2000" dirty="0">
+                <a:solidFill>
+                  <a:schemeClr val="tx1"/>
+                </a:solidFill>
+                <a:latin typeface="Times New Roman" panose="02020603050405020304" pitchFamily="18" charset="0"/>
+                <a:cs typeface="Times New Roman" panose="02020603050405020304" pitchFamily="18" charset="0"/>
+              </a:rPr>
+              <a:t>Projeto Técnico (</a:t>
+            </a:r>
+            <a:r>
+              <a:rPr lang="pt-BR" sz="2000" b="1" dirty="0">
+                <a:solidFill>
+                  <a:schemeClr val="tx1"/>
+                </a:solidFill>
+                <a:latin typeface="Times New Roman" panose="02020603050405020304" pitchFamily="18" charset="0"/>
+                <a:cs typeface="Times New Roman" panose="02020603050405020304" pitchFamily="18" charset="0"/>
+              </a:rPr>
+              <a:t>Negócio</a:t>
+            </a:r>
+            <a:r>
+              <a:rPr lang="pt-BR" sz="2000" dirty="0">
+                <a:solidFill>
+                  <a:schemeClr val="tx1"/>
+                </a:solidFill>
+                <a:latin typeface="Times New Roman" panose="02020603050405020304" pitchFamily="18" charset="0"/>
+                <a:cs typeface="Times New Roman" panose="02020603050405020304" pitchFamily="18" charset="0"/>
+              </a:rPr>
+              <a:t>); </a:t>
             </a:r>
           </a:p>
           <a:p>
@@ -4795,14 +4864,14 @@
               <a:buChar char="ü"/>
             </a:pPr>
             <a:r>
-              <a:rPr lang="pt-BR" sz="2400" dirty="0">
-                <a:solidFill>
-                  <a:schemeClr val="tx1"/>
-                </a:solidFill>
-                <a:latin typeface="Times New Roman" panose="02020603050405020304" pitchFamily="18" charset="0"/>
-                <a:cs typeface="Times New Roman" panose="02020603050405020304" pitchFamily="18" charset="0"/>
-              </a:rPr>
-              <a:t>Diagrama de componentes / Diagrama de Implantação</a:t>
+              <a:rPr lang="pt-BR" sz="2000" dirty="0">
+                <a:solidFill>
+                  <a:schemeClr val="tx1"/>
+                </a:solidFill>
+                <a:latin typeface="Times New Roman" panose="02020603050405020304" pitchFamily="18" charset="0"/>
+                <a:cs typeface="Times New Roman" panose="02020603050405020304" pitchFamily="18" charset="0"/>
+              </a:rPr>
+              <a:t>Projeto Lógico; </a:t>
             </a:r>
           </a:p>
           <a:p>
@@ -4811,38 +4880,83 @@
               <a:buChar char="ü"/>
             </a:pPr>
             <a:r>
-              <a:rPr lang="pt-BR" sz="2400" dirty="0">
-                <a:solidFill>
-                  <a:schemeClr val="tx1"/>
-                </a:solidFill>
-                <a:latin typeface="Times New Roman" panose="02020603050405020304" pitchFamily="18" charset="0"/>
-                <a:cs typeface="Times New Roman" panose="02020603050405020304" pitchFamily="18" charset="0"/>
-              </a:rPr>
-              <a:t>Diagrama de objetos / Diagrama do pacote</a:t>
-            </a:r>
-          </a:p>
-          <a:p>
-            <a:pPr algn="just">
-              <a:buFont typeface="Wingdings" panose="05000000000000000000" pitchFamily="2" charset="2"/>
-              <a:buChar char="ü"/>
+              <a:rPr lang="pt-BR" sz="2000" dirty="0">
+                <a:solidFill>
+                  <a:schemeClr val="tx1"/>
+                </a:solidFill>
+                <a:latin typeface="Times New Roman" panose="02020603050405020304" pitchFamily="18" charset="0"/>
+                <a:cs typeface="Times New Roman" panose="02020603050405020304" pitchFamily="18" charset="0"/>
+              </a:rPr>
+              <a:t>Projeto Físico; </a:t>
+            </a:r>
+          </a:p>
+          <a:p>
+            <a:pPr marL="0" indent="0" algn="just">
+              <a:buNone/>
             </a:pPr>
             <a:r>
-              <a:rPr lang="pt-BR" sz="2400" dirty="0">
-                <a:solidFill>
-                  <a:schemeClr val="tx1"/>
-                </a:solidFill>
-                <a:latin typeface="Times New Roman" panose="02020603050405020304" pitchFamily="18" charset="0"/>
-                <a:cs typeface="Times New Roman" panose="02020603050405020304" pitchFamily="18" charset="0"/>
-              </a:rPr>
-              <a:t>Diagrama de Perfil / Diagrama de Estrutura Composta</a:t>
-            </a:r>
+              <a:rPr lang="pt-BR" sz="2000" b="1" dirty="0">
+                <a:solidFill>
+                  <a:schemeClr val="tx1"/>
+                </a:solidFill>
+                <a:latin typeface="Times New Roman" panose="02020603050405020304" pitchFamily="18" charset="0"/>
+                <a:cs typeface="Times New Roman" panose="02020603050405020304" pitchFamily="18" charset="0"/>
+              </a:rPr>
+              <a:t>Composição (Lógico/Físico)</a:t>
+            </a:r>
+            <a:endParaRPr lang="pt-BR" sz="2000" dirty="0">
+              <a:solidFill>
+                <a:schemeClr val="tx1"/>
+              </a:solidFill>
+              <a:latin typeface="Times New Roman" panose="02020603050405020304" pitchFamily="18" charset="0"/>
+              <a:cs typeface="Times New Roman" panose="02020603050405020304" pitchFamily="18" charset="0"/>
+            </a:endParaRPr>
+          </a:p>
+          <a:p>
+            <a:pPr marL="0" indent="0" algn="just">
+              <a:buNone/>
+            </a:pPr>
+            <a:r>
+              <a:rPr lang="pt-BR" sz="1800" dirty="0">
+                <a:solidFill>
+                  <a:schemeClr val="tx1"/>
+                </a:solidFill>
+                <a:latin typeface="Times New Roman" panose="02020603050405020304" pitchFamily="18" charset="0"/>
+                <a:cs typeface="Times New Roman" panose="02020603050405020304" pitchFamily="18" charset="0"/>
+              </a:rPr>
+              <a:t>Objetivo; Requisitos Funcionais; DER / DD / Diagrama de Contexto; DFD de Nível 0 e por Evento; Diagrama Comportamental; Especificação de Programas; Layouts</a:t>
+            </a:r>
+          </a:p>
+          <a:p>
+            <a:pPr marL="0" indent="0" algn="just">
+              <a:buNone/>
+            </a:pPr>
+            <a:endParaRPr lang="pt-BR" sz="2000" dirty="0">
+              <a:solidFill>
+                <a:schemeClr val="tx1"/>
+              </a:solidFill>
+              <a:latin typeface="Times New Roman" panose="02020603050405020304" pitchFamily="18" charset="0"/>
+              <a:cs typeface="Times New Roman" panose="02020603050405020304" pitchFamily="18" charset="0"/>
+            </a:endParaRPr>
+          </a:p>
+          <a:p>
+            <a:pPr marL="0" indent="0" algn="just">
+              <a:buNone/>
+            </a:pPr>
+            <a:endParaRPr lang="pt-BR" sz="2000" dirty="0">
+              <a:solidFill>
+                <a:schemeClr val="tx1"/>
+              </a:solidFill>
+              <a:latin typeface="Times New Roman" panose="02020603050405020304" pitchFamily="18" charset="0"/>
+              <a:cs typeface="Times New Roman" panose="02020603050405020304" pitchFamily="18" charset="0"/>
+            </a:endParaRPr>
           </a:p>
         </p:txBody>
       </p:sp>
     </p:spTree>
     <p:extLst>
       <p:ext uri="{BB962C8B-B14F-4D97-AF65-F5344CB8AC3E}">
-        <p14:creationId xmlns:p14="http://schemas.microsoft.com/office/powerpoint/2010/main" val="3828633150"/>
+        <p14:creationId xmlns:p14="http://schemas.microsoft.com/office/powerpoint/2010/main" val="1890726142"/>
       </p:ext>
     </p:extLst>
   </p:cSld>
@@ -4929,6 +5043,292 @@
               <a:buNone/>
             </a:pPr>
             <a:r>
+              <a:rPr lang="pt-BR" sz="2400" dirty="0">
+                <a:solidFill>
+                  <a:schemeClr val="tx1"/>
+                </a:solidFill>
+                <a:latin typeface="Times New Roman" panose="02020603050405020304" pitchFamily="18" charset="0"/>
+                <a:cs typeface="Times New Roman" panose="02020603050405020304" pitchFamily="18" charset="0"/>
+              </a:rPr>
+              <a:t>A </a:t>
+            </a:r>
+            <a:r>
+              <a:rPr lang="pt-BR" sz="2400" b="1" dirty="0">
+                <a:solidFill>
+                  <a:srgbClr val="FF0000"/>
+                </a:solidFill>
+                <a:latin typeface="Times New Roman" panose="02020603050405020304" pitchFamily="18" charset="0"/>
+                <a:cs typeface="Times New Roman" panose="02020603050405020304" pitchFamily="18" charset="0"/>
+              </a:rPr>
+              <a:t>UML</a:t>
+            </a:r>
+            <a:r>
+              <a:rPr lang="pt-BR" sz="2400" dirty="0">
+                <a:solidFill>
+                  <a:schemeClr val="tx1"/>
+                </a:solidFill>
+                <a:latin typeface="Times New Roman" panose="02020603050405020304" pitchFamily="18" charset="0"/>
+                <a:cs typeface="Times New Roman" panose="02020603050405020304" pitchFamily="18" charset="0"/>
+              </a:rPr>
+              <a:t> (do inglês </a:t>
+            </a:r>
+            <a:r>
+              <a:rPr lang="pt-BR" sz="2400" dirty="0" err="1">
+                <a:solidFill>
+                  <a:schemeClr val="tx1"/>
+                </a:solidFill>
+                <a:latin typeface="Times New Roman" panose="02020603050405020304" pitchFamily="18" charset="0"/>
+                <a:cs typeface="Times New Roman" panose="02020603050405020304" pitchFamily="18" charset="0"/>
+              </a:rPr>
+              <a:t>Unified</a:t>
+            </a:r>
+            <a:r>
+              <a:rPr lang="pt-BR" sz="2400" dirty="0">
+                <a:solidFill>
+                  <a:schemeClr val="tx1"/>
+                </a:solidFill>
+                <a:latin typeface="Times New Roman" panose="02020603050405020304" pitchFamily="18" charset="0"/>
+                <a:cs typeface="Times New Roman" panose="02020603050405020304" pitchFamily="18" charset="0"/>
+              </a:rPr>
+              <a:t> </a:t>
+            </a:r>
+            <a:r>
+              <a:rPr lang="pt-BR" sz="2400" dirty="0" err="1">
+                <a:solidFill>
+                  <a:schemeClr val="tx1"/>
+                </a:solidFill>
+                <a:latin typeface="Times New Roman" panose="02020603050405020304" pitchFamily="18" charset="0"/>
+                <a:cs typeface="Times New Roman" panose="02020603050405020304" pitchFamily="18" charset="0"/>
+              </a:rPr>
+              <a:t>Modeling</a:t>
+            </a:r>
+            <a:r>
+              <a:rPr lang="pt-BR" sz="2400" dirty="0">
+                <a:solidFill>
+                  <a:schemeClr val="tx1"/>
+                </a:solidFill>
+                <a:latin typeface="Times New Roman" panose="02020603050405020304" pitchFamily="18" charset="0"/>
+                <a:cs typeface="Times New Roman" panose="02020603050405020304" pitchFamily="18" charset="0"/>
+              </a:rPr>
+              <a:t> </a:t>
+            </a:r>
+            <a:r>
+              <a:rPr lang="pt-BR" sz="2400" dirty="0" err="1">
+                <a:solidFill>
+                  <a:schemeClr val="tx1"/>
+                </a:solidFill>
+                <a:latin typeface="Times New Roman" panose="02020603050405020304" pitchFamily="18" charset="0"/>
+                <a:cs typeface="Times New Roman" panose="02020603050405020304" pitchFamily="18" charset="0"/>
+              </a:rPr>
+              <a:t>Language</a:t>
+            </a:r>
+            <a:r>
+              <a:rPr lang="pt-BR" sz="2400" dirty="0">
+                <a:solidFill>
+                  <a:schemeClr val="tx1"/>
+                </a:solidFill>
+                <a:latin typeface="Times New Roman" panose="02020603050405020304" pitchFamily="18" charset="0"/>
+                <a:cs typeface="Times New Roman" panose="02020603050405020304" pitchFamily="18" charset="0"/>
+              </a:rPr>
+              <a:t>), é uma linguagem-padrão para a elaboração da estrutura de projetos de software.</a:t>
+            </a:r>
+          </a:p>
+          <a:p>
+            <a:pPr marL="0" indent="0" algn="just">
+              <a:buNone/>
+            </a:pPr>
+            <a:endParaRPr lang="pt-BR" sz="2400" dirty="0">
+              <a:solidFill>
+                <a:schemeClr val="tx1"/>
+              </a:solidFill>
+              <a:latin typeface="Times New Roman" panose="02020603050405020304" pitchFamily="18" charset="0"/>
+              <a:cs typeface="Times New Roman" panose="02020603050405020304" pitchFamily="18" charset="0"/>
+            </a:endParaRPr>
+          </a:p>
+          <a:p>
+            <a:pPr marL="0" indent="0" algn="just">
+              <a:buNone/>
+            </a:pPr>
+            <a:r>
+              <a:rPr lang="pt-BR" sz="2400" b="1" dirty="0">
+                <a:solidFill>
+                  <a:srgbClr val="FF0000"/>
+                </a:solidFill>
+                <a:latin typeface="Times New Roman" panose="02020603050405020304" pitchFamily="18" charset="0"/>
+                <a:cs typeface="Times New Roman" panose="02020603050405020304" pitchFamily="18" charset="0"/>
+              </a:rPr>
+              <a:t>Diagramas Estruturais</a:t>
+            </a:r>
+          </a:p>
+          <a:p>
+            <a:pPr algn="just">
+              <a:buFont typeface="Wingdings" panose="05000000000000000000" pitchFamily="2" charset="2"/>
+              <a:buChar char="ü"/>
+            </a:pPr>
+            <a:endParaRPr lang="pt-BR" sz="2400" dirty="0">
+              <a:solidFill>
+                <a:schemeClr val="tx1"/>
+              </a:solidFill>
+              <a:latin typeface="Times New Roman" panose="02020603050405020304" pitchFamily="18" charset="0"/>
+              <a:cs typeface="Times New Roman" panose="02020603050405020304" pitchFamily="18" charset="0"/>
+            </a:endParaRPr>
+          </a:p>
+          <a:p>
+            <a:pPr algn="just">
+              <a:buFont typeface="Wingdings" panose="05000000000000000000" pitchFamily="2" charset="2"/>
+              <a:buChar char="ü"/>
+            </a:pPr>
+            <a:r>
+              <a:rPr lang="pt-BR" sz="2400" dirty="0">
+                <a:solidFill>
+                  <a:schemeClr val="tx1"/>
+                </a:solidFill>
+                <a:latin typeface="Times New Roman" panose="02020603050405020304" pitchFamily="18" charset="0"/>
+                <a:cs typeface="Times New Roman" panose="02020603050405020304" pitchFamily="18" charset="0"/>
+              </a:rPr>
+              <a:t>Diagrama de Classes / Entidades</a:t>
+            </a:r>
+          </a:p>
+          <a:p>
+            <a:pPr algn="just">
+              <a:buFont typeface="Wingdings" panose="05000000000000000000" pitchFamily="2" charset="2"/>
+              <a:buChar char="ü"/>
+            </a:pPr>
+            <a:r>
+              <a:rPr lang="pt-BR" sz="2400" dirty="0">
+                <a:solidFill>
+                  <a:schemeClr val="tx1"/>
+                </a:solidFill>
+                <a:latin typeface="Times New Roman" panose="02020603050405020304" pitchFamily="18" charset="0"/>
+                <a:cs typeface="Times New Roman" panose="02020603050405020304" pitchFamily="18" charset="0"/>
+              </a:rPr>
+              <a:t>Diagrama de componentes / Diagrama de Implantação</a:t>
+            </a:r>
+          </a:p>
+          <a:p>
+            <a:pPr algn="just">
+              <a:buFont typeface="Wingdings" panose="05000000000000000000" pitchFamily="2" charset="2"/>
+              <a:buChar char="ü"/>
+            </a:pPr>
+            <a:r>
+              <a:rPr lang="pt-BR" sz="2400" dirty="0">
+                <a:solidFill>
+                  <a:schemeClr val="tx1"/>
+                </a:solidFill>
+                <a:latin typeface="Times New Roman" panose="02020603050405020304" pitchFamily="18" charset="0"/>
+                <a:cs typeface="Times New Roman" panose="02020603050405020304" pitchFamily="18" charset="0"/>
+              </a:rPr>
+              <a:t>Diagrama de objetos / Diagrama do pacote</a:t>
+            </a:r>
+          </a:p>
+          <a:p>
+            <a:pPr algn="just">
+              <a:buFont typeface="Wingdings" panose="05000000000000000000" pitchFamily="2" charset="2"/>
+              <a:buChar char="ü"/>
+            </a:pPr>
+            <a:r>
+              <a:rPr lang="pt-BR" sz="2400" dirty="0">
+                <a:solidFill>
+                  <a:schemeClr val="tx1"/>
+                </a:solidFill>
+                <a:latin typeface="Times New Roman" panose="02020603050405020304" pitchFamily="18" charset="0"/>
+                <a:cs typeface="Times New Roman" panose="02020603050405020304" pitchFamily="18" charset="0"/>
+              </a:rPr>
+              <a:t>Diagrama de Perfil / Diagrama de Estrutura Composta</a:t>
+            </a:r>
+          </a:p>
+        </p:txBody>
+      </p:sp>
+    </p:spTree>
+    <p:extLst>
+      <p:ext uri="{BB962C8B-B14F-4D97-AF65-F5344CB8AC3E}">
+        <p14:creationId xmlns:p14="http://schemas.microsoft.com/office/powerpoint/2010/main" val="3828633150"/>
+      </p:ext>
+    </p:extLst>
+  </p:cSld>
+  <p:clrMapOvr>
+    <a:masterClrMapping/>
+  </p:clrMapOvr>
+  <p:transition spd="med"/>
+</p:sld>
+</file>
+
+<file path=ppt/slides/slide13.xml><?xml version="1.0" encoding="utf-8"?>
+<p:sld xmlns:a="http://schemas.openxmlformats.org/drawingml/2006/main" xmlns:r="http://schemas.openxmlformats.org/officeDocument/2006/relationships" xmlns:p="http://schemas.openxmlformats.org/presentationml/2006/main">
+  <p:cSld>
+    <p:spTree>
+      <p:nvGrpSpPr>
+        <p:cNvPr id="1" name=""/>
+        <p:cNvGrpSpPr/>
+        <p:nvPr/>
+      </p:nvGrpSpPr>
+      <p:grpSpPr>
+        <a:xfrm>
+          <a:off x="0" y="0"/>
+          <a:ext cx="0" cy="0"/>
+          <a:chOff x="0" y="0"/>
+          <a:chExt cx="0" cy="0"/>
+        </a:xfrm>
+      </p:grpSpPr>
+      <p:sp>
+        <p:nvSpPr>
+          <p:cNvPr id="6" name="Title 1"/>
+          <p:cNvSpPr>
+            <a:spLocks noGrp="1"/>
+          </p:cNvSpPr>
+          <p:nvPr>
+            <p:ph type="title"/>
+          </p:nvPr>
+        </p:nvSpPr>
+        <p:spPr>
+          <a:xfrm>
+            <a:off x="457200" y="155876"/>
+            <a:ext cx="8229600" cy="857251"/>
+          </a:xfrm>
+        </p:spPr>
+        <p:txBody>
+          <a:bodyPr>
+            <a:normAutofit/>
+          </a:bodyPr>
+          <a:lstStyle/>
+          <a:p>
+            <a:r>
+              <a:rPr lang="en-US" b="1" dirty="0">
+                <a:solidFill>
+                  <a:srgbClr val="0070C0"/>
+                </a:solidFill>
+              </a:rPr>
+              <a:t>JAVA – UML</a:t>
+            </a:r>
+          </a:p>
+        </p:txBody>
+      </p:sp>
+      <p:sp>
+        <p:nvSpPr>
+          <p:cNvPr id="8" name="Text Placeholder 2"/>
+          <p:cNvSpPr>
+            <a:spLocks noGrp="1"/>
+          </p:cNvSpPr>
+          <p:nvPr>
+            <p:ph type="body" sz="half" idx="1"/>
+          </p:nvPr>
+        </p:nvSpPr>
+        <p:spPr>
+          <a:xfrm>
+            <a:off x="142865" y="1037312"/>
+            <a:ext cx="8865056" cy="3900208"/>
+          </a:xfrm>
+        </p:spPr>
+        <p:txBody>
+          <a:bodyPr>
+            <a:noAutofit/>
+          </a:bodyPr>
+          <a:lstStyle/>
+          <a:p>
+            <a:pPr marL="0" indent="0" algn="just">
+              <a:buNone/>
+            </a:pPr>
+            <a:r>
               <a:rPr lang="pt-BR" sz="2400" b="1" dirty="0">
                 <a:solidFill>
                   <a:srgbClr val="FF0000"/>
@@ -5187,7 +5587,7 @@
 </p:sld>
 </file>
 
-<file path=ppt/slides/slide13.xml><?xml version="1.0" encoding="utf-8"?>
+<file path=ppt/slides/slide14.xml><?xml version="1.0" encoding="utf-8"?>
 <p:sld xmlns:a="http://schemas.openxmlformats.org/drawingml/2006/main" xmlns:r="http://schemas.openxmlformats.org/officeDocument/2006/relationships" xmlns:p="http://schemas.openxmlformats.org/presentationml/2006/main">
   <p:cSld>
     <p:spTree>
@@ -5322,250 +5722,6 @@
 </p:sld>
 </file>
 
-<file path=ppt/slides/slide14.xml><?xml version="1.0" encoding="utf-8"?>
-<p:sld xmlns:a="http://schemas.openxmlformats.org/drawingml/2006/main" xmlns:r="http://schemas.openxmlformats.org/officeDocument/2006/relationships" xmlns:p="http://schemas.openxmlformats.org/presentationml/2006/main">
-  <p:cSld>
-    <p:spTree>
-      <p:nvGrpSpPr>
-        <p:cNvPr id="1" name=""/>
-        <p:cNvGrpSpPr/>
-        <p:nvPr/>
-      </p:nvGrpSpPr>
-      <p:grpSpPr>
-        <a:xfrm>
-          <a:off x="0" y="0"/>
-          <a:ext cx="0" cy="0"/>
-          <a:chOff x="0" y="0"/>
-          <a:chExt cx="0" cy="0"/>
-        </a:xfrm>
-      </p:grpSpPr>
-      <p:sp>
-        <p:nvSpPr>
-          <p:cNvPr id="6" name="Title 1"/>
-          <p:cNvSpPr>
-            <a:spLocks noGrp="1"/>
-          </p:cNvSpPr>
-          <p:nvPr>
-            <p:ph type="title"/>
-          </p:nvPr>
-        </p:nvSpPr>
-        <p:spPr>
-          <a:xfrm>
-            <a:off x="457200" y="205980"/>
-            <a:ext cx="8229600" cy="857251"/>
-          </a:xfrm>
-        </p:spPr>
-        <p:txBody>
-          <a:bodyPr>
-            <a:normAutofit/>
-          </a:bodyPr>
-          <a:lstStyle/>
-          <a:p>
-            <a:r>
-              <a:rPr lang="en-US" b="1" dirty="0" err="1">
-                <a:solidFill>
-                  <a:srgbClr val="0070C0"/>
-                </a:solidFill>
-              </a:rPr>
-              <a:t>Leitura</a:t>
-            </a:r>
-            <a:r>
-              <a:rPr lang="en-US" b="1" dirty="0">
-                <a:solidFill>
-                  <a:srgbClr val="0070C0"/>
-                </a:solidFill>
-              </a:rPr>
-              <a:t> </a:t>
-            </a:r>
-            <a:r>
-              <a:rPr lang="en-US" b="1" dirty="0" err="1">
-                <a:solidFill>
-                  <a:srgbClr val="0070C0"/>
-                </a:solidFill>
-              </a:rPr>
-              <a:t>Específica</a:t>
-            </a:r>
-            <a:endParaRPr lang="en-US" b="1" dirty="0">
-              <a:solidFill>
-                <a:srgbClr val="0070C0"/>
-              </a:solidFill>
-            </a:endParaRPr>
-          </a:p>
-        </p:txBody>
-      </p:sp>
-      <p:sp>
-        <p:nvSpPr>
-          <p:cNvPr id="8" name="Text Placeholder 2"/>
-          <p:cNvSpPr>
-            <a:spLocks noGrp="1"/>
-          </p:cNvSpPr>
-          <p:nvPr>
-            <p:ph type="body" sz="half" idx="1"/>
-          </p:nvPr>
-        </p:nvSpPr>
-        <p:spPr>
-          <a:xfrm>
-            <a:off x="142865" y="1012261"/>
-            <a:ext cx="8865056" cy="3835312"/>
-          </a:xfrm>
-        </p:spPr>
-        <p:txBody>
-          <a:bodyPr>
-            <a:noAutofit/>
-          </a:bodyPr>
-          <a:lstStyle/>
-          <a:p>
-            <a:pPr marL="0" indent="0" algn="just">
-              <a:buNone/>
-            </a:pPr>
-            <a:r>
-              <a:rPr lang="pt-BR" sz="2400" dirty="0">
-                <a:latin typeface="Times New Roman" panose="02020603050405020304" pitchFamily="18" charset="0"/>
-                <a:cs typeface="Times New Roman" panose="02020603050405020304" pitchFamily="18" charset="0"/>
-              </a:rPr>
-              <a:t>[1]</a:t>
-            </a:r>
-          </a:p>
-          <a:p>
-            <a:pPr marL="0" indent="0" algn="just">
-              <a:buNone/>
-            </a:pPr>
-            <a:r>
-              <a:rPr lang="pt-BR" sz="2400" b="1" dirty="0">
-                <a:latin typeface="Times New Roman" panose="02020603050405020304" pitchFamily="18" charset="0"/>
-                <a:cs typeface="Times New Roman" panose="02020603050405020304" pitchFamily="18" charset="0"/>
-              </a:rPr>
-              <a:t>	Disponível em</a:t>
-            </a:r>
-            <a:r>
-              <a:rPr lang="pt-BR" sz="2400" dirty="0">
-                <a:latin typeface="Times New Roman" panose="02020603050405020304" pitchFamily="18" charset="0"/>
-                <a:cs typeface="Times New Roman" panose="02020603050405020304" pitchFamily="18" charset="0"/>
-              </a:rPr>
-              <a:t>: </a:t>
-            </a:r>
-            <a:r>
-              <a:rPr lang="pt-BR" sz="2400" dirty="0">
-                <a:latin typeface="Times New Roman" panose="02020603050405020304" pitchFamily="18" charset="0"/>
-                <a:cs typeface="Times New Roman" panose="02020603050405020304" pitchFamily="18" charset="0"/>
-                <a:hlinkClick r:id="rId3"/>
-              </a:rPr>
-              <a:t>https://s3.novatec.com.br/capitulos/capitulo-9788575222621.pdf</a:t>
-            </a:r>
-            <a:endParaRPr lang="pt-BR" sz="2400" dirty="0">
-              <a:latin typeface="Times New Roman" panose="02020603050405020304" pitchFamily="18" charset="0"/>
-              <a:cs typeface="Times New Roman" panose="02020603050405020304" pitchFamily="18" charset="0"/>
-            </a:endParaRPr>
-          </a:p>
-          <a:p>
-            <a:pPr marL="0" indent="0" algn="just">
-              <a:buNone/>
-            </a:pPr>
-            <a:endParaRPr lang="pt-BR" sz="2400" dirty="0">
-              <a:latin typeface="Times New Roman" panose="02020603050405020304" pitchFamily="18" charset="0"/>
-              <a:cs typeface="Times New Roman" panose="02020603050405020304" pitchFamily="18" charset="0"/>
-            </a:endParaRPr>
-          </a:p>
-          <a:p>
-            <a:pPr marL="0" indent="0" algn="just">
-              <a:buNone/>
-            </a:pPr>
-            <a:r>
-              <a:rPr lang="pt-BR" sz="2400" dirty="0">
-                <a:latin typeface="Times New Roman" panose="02020603050405020304" pitchFamily="18" charset="0"/>
-                <a:cs typeface="Times New Roman" panose="02020603050405020304" pitchFamily="18" charset="0"/>
-              </a:rPr>
-              <a:t>[2]</a:t>
-            </a:r>
-            <a:endParaRPr lang="pt-BR" sz="2400" b="1" dirty="0">
-              <a:latin typeface="Times New Roman" panose="02020603050405020304" pitchFamily="18" charset="0"/>
-              <a:cs typeface="Times New Roman" panose="02020603050405020304" pitchFamily="18" charset="0"/>
-            </a:endParaRPr>
-          </a:p>
-          <a:p>
-            <a:pPr marL="0" indent="0" algn="just">
-              <a:buNone/>
-            </a:pPr>
-            <a:r>
-              <a:rPr lang="pt-BR" sz="2400" dirty="0">
-                <a:latin typeface="Times New Roman" panose="02020603050405020304" pitchFamily="18" charset="0"/>
-                <a:cs typeface="Times New Roman" panose="02020603050405020304" pitchFamily="18" charset="0"/>
-              </a:rPr>
-              <a:t>	</a:t>
-            </a:r>
-            <a:r>
-              <a:rPr lang="pt-BR" sz="2400" b="1" dirty="0">
-                <a:latin typeface="Times New Roman" panose="02020603050405020304" pitchFamily="18" charset="0"/>
-                <a:cs typeface="Times New Roman" panose="02020603050405020304" pitchFamily="18" charset="0"/>
-              </a:rPr>
-              <a:t> Disponível em</a:t>
-            </a:r>
-            <a:r>
-              <a:rPr lang="pt-BR" sz="2400" dirty="0">
-                <a:latin typeface="Times New Roman" panose="02020603050405020304" pitchFamily="18" charset="0"/>
-                <a:cs typeface="Times New Roman" panose="02020603050405020304" pitchFamily="18" charset="0"/>
-              </a:rPr>
-              <a:t>:</a:t>
-            </a:r>
-          </a:p>
-          <a:p>
-            <a:pPr marL="0" indent="0" algn="just">
-              <a:buNone/>
-            </a:pPr>
-            <a:r>
-              <a:rPr lang="pt-BR" sz="2400" dirty="0">
-                <a:latin typeface="Times New Roman" panose="02020603050405020304" pitchFamily="18" charset="0"/>
-                <a:cs typeface="Times New Roman" panose="02020603050405020304" pitchFamily="18" charset="0"/>
-              </a:rPr>
-              <a:t> </a:t>
-            </a:r>
-            <a:r>
-              <a:rPr lang="pt-BR" sz="2400" dirty="0">
-                <a:latin typeface="Times New Roman" panose="02020603050405020304" pitchFamily="18" charset="0"/>
-                <a:cs typeface="Times New Roman" panose="02020603050405020304" pitchFamily="18" charset="0"/>
-                <a:hlinkClick r:id="rId4"/>
-              </a:rPr>
-              <a:t>http://www-sop.inria.fr/oasis/SAFA/slides09/KEYNOTE_SAFA_2009_Mallet.pdf</a:t>
-            </a:r>
-            <a:endParaRPr lang="pt-BR" sz="2400" dirty="0">
-              <a:latin typeface="Times New Roman" panose="02020603050405020304" pitchFamily="18" charset="0"/>
-              <a:cs typeface="Times New Roman" panose="02020603050405020304" pitchFamily="18" charset="0"/>
-            </a:endParaRPr>
-          </a:p>
-          <a:p>
-            <a:pPr marL="0" indent="0" algn="just">
-              <a:buNone/>
-            </a:pPr>
-            <a:endParaRPr lang="pt-BR" sz="2400" dirty="0">
-              <a:latin typeface="Times New Roman" panose="02020603050405020304" pitchFamily="18" charset="0"/>
-              <a:cs typeface="Times New Roman" panose="02020603050405020304" pitchFamily="18" charset="0"/>
-            </a:endParaRPr>
-          </a:p>
-          <a:p>
-            <a:pPr marL="0" indent="0" algn="just">
-              <a:buNone/>
-            </a:pPr>
-            <a:endParaRPr lang="pt-BR" sz="2400" dirty="0">
-              <a:latin typeface="Times New Roman" panose="02020603050405020304" pitchFamily="18" charset="0"/>
-              <a:cs typeface="Times New Roman" panose="02020603050405020304" pitchFamily="18" charset="0"/>
-            </a:endParaRPr>
-          </a:p>
-        </p:txBody>
-      </p:sp>
-    </p:spTree>
-    <p:extLst>
-      <p:ext uri="{BB962C8B-B14F-4D97-AF65-F5344CB8AC3E}">
-        <p14:creationId xmlns:p14="http://schemas.microsoft.com/office/powerpoint/2010/main" val="3680270425"/>
-      </p:ext>
-    </p:extLst>
-  </p:cSld>
-  <p:clrMapOvr>
-    <a:masterClrMapping/>
-  </p:clrMapOvr>
-  <p:transition spd="med"/>
-</p:sld>
-</file>
-
 <file path=ppt/slides/slide15.xml><?xml version="1.0" encoding="utf-8"?>
 <p:sld xmlns:a="http://schemas.openxmlformats.org/drawingml/2006/main" xmlns:r="http://schemas.openxmlformats.org/officeDocument/2006/relationships" xmlns:p="http://schemas.openxmlformats.org/presentationml/2006/main">
   <p:cSld>
@@ -5611,7 +5767,7 @@
                   <a:srgbClr val="0070C0"/>
                 </a:solidFill>
               </a:rPr>
-              <a:t>Aprenda</a:t>
+              <a:t>Leitura</a:t>
             </a:r>
             <a:r>
               <a:rPr lang="en-US" b="1" dirty="0">
@@ -5619,8 +5775,21 @@
                   <a:srgbClr val="0070C0"/>
                 </a:solidFill>
               </a:rPr>
-              <a:t>+</a:t>
-            </a:r>
+              <a:t> </a:t>
+            </a:r>
+            <a:r>
+              <a:rPr lang="en-US" b="1" dirty="0" err="1">
+                <a:solidFill>
+                  <a:srgbClr val="0070C0"/>
+                </a:solidFill>
+              </a:rPr>
+              <a:t>Específica</a:t>
+            </a:r>
+            <a:endParaRPr lang="en-US" b="1" dirty="0">
+              <a:solidFill>
+                <a:srgbClr val="0070C0"/>
+              </a:solidFill>
+            </a:endParaRPr>
           </a:p>
         </p:txBody>
       </p:sp>
@@ -5636,8 +5805,8 @@
         </p:nvSpPr>
         <p:spPr>
           <a:xfrm>
-            <a:off x="142865" y="1200151"/>
-            <a:ext cx="8865056" cy="3394472"/>
+            <a:off x="142865" y="1012261"/>
+            <a:ext cx="8865056" cy="3835312"/>
           </a:xfrm>
         </p:spPr>
         <p:txBody>
@@ -5649,21 +5818,31 @@
             <a:pPr marL="0" indent="0" algn="just">
               <a:buNone/>
             </a:pPr>
-            <a:endParaRPr lang="pt-BR" sz="2400" dirty="0">
-              <a:latin typeface="Times New Roman" panose="02020603050405020304" pitchFamily="18" charset="0"/>
-              <a:cs typeface="Times New Roman" panose="02020603050405020304" pitchFamily="18" charset="0"/>
-            </a:endParaRPr>
+            <a:r>
+              <a:rPr lang="pt-BR" sz="2400" dirty="0">
+                <a:latin typeface="Times New Roman" panose="02020603050405020304" pitchFamily="18" charset="0"/>
+                <a:cs typeface="Times New Roman" panose="02020603050405020304" pitchFamily="18" charset="0"/>
+              </a:rPr>
+              <a:t>[1]</a:t>
+            </a:r>
           </a:p>
           <a:p>
             <a:pPr marL="0" indent="0" algn="just">
               <a:buNone/>
             </a:pPr>
             <a:r>
+              <a:rPr lang="pt-BR" sz="2400" b="1" dirty="0">
+                <a:latin typeface="Times New Roman" panose="02020603050405020304" pitchFamily="18" charset="0"/>
+                <a:cs typeface="Times New Roman" panose="02020603050405020304" pitchFamily="18" charset="0"/>
+              </a:rPr>
+              <a:t>	Disponível em</a:t>
+            </a:r>
+            <a:r>
               <a:rPr lang="pt-BR" sz="2400" dirty="0">
                 <a:latin typeface="Times New Roman" panose="02020603050405020304" pitchFamily="18" charset="0"/>
                 <a:cs typeface="Times New Roman" panose="02020603050405020304" pitchFamily="18" charset="0"/>
               </a:rPr>
-              <a:t>[1] </a:t>
+              <a:t>: </a:t>
             </a:r>
             <a:r>
               <a:rPr lang="pt-BR" sz="2400" dirty="0">
@@ -5671,7 +5850,7 @@
                 <a:cs typeface="Times New Roman" panose="02020603050405020304" pitchFamily="18" charset="0"/>
                 <a:hlinkClick r:id="rId3"/>
               </a:rPr>
-              <a:t>https://www.youtube.com/watch?v=QY0Kdg83orY</a:t>
+              <a:t>https://s3.novatec.com.br/capitulos/capitulo-9788575222621.pdf</a:t>
             </a:r>
             <a:endParaRPr lang="pt-BR" sz="2400" dirty="0">
               <a:latin typeface="Times New Roman" panose="02020603050405020304" pitchFamily="18" charset="0"/>
@@ -5691,6 +5870,63 @@
             <a:pPr marL="0" indent="0" algn="just">
               <a:buNone/>
             </a:pPr>
+            <a:r>
+              <a:rPr lang="pt-BR" sz="2400" dirty="0">
+                <a:latin typeface="Times New Roman" panose="02020603050405020304" pitchFamily="18" charset="0"/>
+                <a:cs typeface="Times New Roman" panose="02020603050405020304" pitchFamily="18" charset="0"/>
+              </a:rPr>
+              <a:t>[2]</a:t>
+            </a:r>
+            <a:endParaRPr lang="pt-BR" sz="2400" b="1" dirty="0">
+              <a:latin typeface="Times New Roman" panose="02020603050405020304" pitchFamily="18" charset="0"/>
+              <a:cs typeface="Times New Roman" panose="02020603050405020304" pitchFamily="18" charset="0"/>
+            </a:endParaRPr>
+          </a:p>
+          <a:p>
+            <a:pPr marL="0" indent="0" algn="just">
+              <a:buNone/>
+            </a:pPr>
+            <a:r>
+              <a:rPr lang="pt-BR" sz="2400" dirty="0">
+                <a:latin typeface="Times New Roman" panose="02020603050405020304" pitchFamily="18" charset="0"/>
+                <a:cs typeface="Times New Roman" panose="02020603050405020304" pitchFamily="18" charset="0"/>
+              </a:rPr>
+              <a:t>	</a:t>
+            </a:r>
+            <a:r>
+              <a:rPr lang="pt-BR" sz="2400" b="1" dirty="0">
+                <a:latin typeface="Times New Roman" panose="02020603050405020304" pitchFamily="18" charset="0"/>
+                <a:cs typeface="Times New Roman" panose="02020603050405020304" pitchFamily="18" charset="0"/>
+              </a:rPr>
+              <a:t> Disponível em</a:t>
+            </a:r>
+            <a:r>
+              <a:rPr lang="pt-BR" sz="2400" dirty="0">
+                <a:latin typeface="Times New Roman" panose="02020603050405020304" pitchFamily="18" charset="0"/>
+                <a:cs typeface="Times New Roman" panose="02020603050405020304" pitchFamily="18" charset="0"/>
+              </a:rPr>
+              <a:t>:</a:t>
+            </a:r>
+          </a:p>
+          <a:p>
+            <a:pPr marL="0" indent="0" algn="just">
+              <a:buNone/>
+            </a:pPr>
+            <a:r>
+              <a:rPr lang="pt-BR" sz="2400" dirty="0">
+                <a:latin typeface="Times New Roman" panose="02020603050405020304" pitchFamily="18" charset="0"/>
+                <a:cs typeface="Times New Roman" panose="02020603050405020304" pitchFamily="18" charset="0"/>
+              </a:rPr>
+              <a:t> </a:t>
+            </a:r>
+            <a:r>
+              <a:rPr lang="pt-BR" sz="2400" dirty="0">
+                <a:latin typeface="Times New Roman" panose="02020603050405020304" pitchFamily="18" charset="0"/>
+                <a:cs typeface="Times New Roman" panose="02020603050405020304" pitchFamily="18" charset="0"/>
+                <a:hlinkClick r:id="rId4"/>
+              </a:rPr>
+              <a:t>http://www-sop.inria.fr/oasis/SAFA/slides09/KEYNOTE_SAFA_2009_Mallet.pdf</a:t>
+            </a:r>
             <a:endParaRPr lang="pt-BR" sz="2400" dirty="0">
               <a:latin typeface="Times New Roman" panose="02020603050405020304" pitchFamily="18" charset="0"/>
               <a:cs typeface="Times New Roman" panose="02020603050405020304" pitchFamily="18" charset="0"/>
@@ -5709,57 +5945,6 @@
             <a:pPr marL="0" indent="0" algn="just">
               <a:buNone/>
             </a:pPr>
-            <a:r>
-              <a:rPr lang="pt-BR" sz="2400" dirty="0">
-                <a:latin typeface="Times New Roman" panose="02020603050405020304" pitchFamily="18" charset="0"/>
-                <a:cs typeface="Times New Roman" panose="02020603050405020304" pitchFamily="18" charset="0"/>
-              </a:rPr>
-              <a:t>[2] </a:t>
-            </a:r>
-            <a:r>
-              <a:rPr lang="pt-BR" sz="2400" dirty="0">
-                <a:latin typeface="Times New Roman" panose="02020603050405020304" pitchFamily="18" charset="0"/>
-                <a:cs typeface="Times New Roman" panose="02020603050405020304" pitchFamily="18" charset="0"/>
-                <a:hlinkClick r:id="rId4"/>
-              </a:rPr>
-              <a:t>https://www.youtube.com/watch?v=aBhVJM31nBM</a:t>
-            </a:r>
-            <a:endParaRPr lang="pt-BR" sz="2400" dirty="0">
-              <a:latin typeface="Times New Roman" panose="02020603050405020304" pitchFamily="18" charset="0"/>
-              <a:cs typeface="Times New Roman" panose="02020603050405020304" pitchFamily="18" charset="0"/>
-            </a:endParaRPr>
-          </a:p>
-          <a:p>
-            <a:pPr marL="0" indent="0" algn="just">
-              <a:buNone/>
-            </a:pPr>
-            <a:endParaRPr lang="pt-BR" sz="2400" dirty="0">
-              <a:latin typeface="Times New Roman" panose="02020603050405020304" pitchFamily="18" charset="0"/>
-              <a:cs typeface="Times New Roman" panose="02020603050405020304" pitchFamily="18" charset="0"/>
-            </a:endParaRPr>
-          </a:p>
-          <a:p>
-            <a:pPr marL="0" indent="0" algn="just">
-              <a:buNone/>
-            </a:pPr>
-            <a:endParaRPr lang="pt-BR" sz="2400" dirty="0">
-              <a:latin typeface="Times New Roman" panose="02020603050405020304" pitchFamily="18" charset="0"/>
-              <a:cs typeface="Times New Roman" panose="02020603050405020304" pitchFamily="18" charset="0"/>
-            </a:endParaRPr>
-          </a:p>
-          <a:p>
-            <a:pPr marL="0" indent="0" algn="just">
-              <a:buNone/>
-            </a:pPr>
-            <a:endParaRPr lang="pt-BR" sz="2400" dirty="0">
-              <a:latin typeface="Times New Roman" panose="02020603050405020304" pitchFamily="18" charset="0"/>
-              <a:cs typeface="Times New Roman" panose="02020603050405020304" pitchFamily="18" charset="0"/>
-            </a:endParaRPr>
-          </a:p>
-          <a:p>
-            <a:pPr marL="0" indent="0" algn="just">
-              <a:buNone/>
-            </a:pPr>
             <a:endParaRPr lang="pt-BR" sz="2400" dirty="0">
               <a:latin typeface="Times New Roman" panose="02020603050405020304" pitchFamily="18" charset="0"/>
               <a:cs typeface="Times New Roman" panose="02020603050405020304" pitchFamily="18" charset="0"/>
@@ -5770,7 +5955,7 @@
     </p:spTree>
     <p:extLst>
       <p:ext uri="{BB962C8B-B14F-4D97-AF65-F5344CB8AC3E}">
-        <p14:creationId xmlns:p14="http://schemas.microsoft.com/office/powerpoint/2010/main" val="2747596967"/>
+        <p14:creationId xmlns:p14="http://schemas.microsoft.com/office/powerpoint/2010/main" val="3680270425"/>
       </p:ext>
     </p:extLst>
   </p:cSld>
@@ -5826,7 +6011,7 @@
                   <a:srgbClr val="0070C0"/>
                 </a:solidFill>
               </a:rPr>
-              <a:t>Dinâmica</a:t>
+              <a:t>Aprenda</a:t>
             </a:r>
             <a:r>
               <a:rPr lang="en-US" b="1" dirty="0">
@@ -5834,21 +6019,8 @@
                   <a:srgbClr val="0070C0"/>
                 </a:solidFill>
               </a:rPr>
-              <a:t>/</a:t>
-            </a:r>
-            <a:r>
-              <a:rPr lang="en-US" b="1" dirty="0" err="1">
-                <a:solidFill>
-                  <a:srgbClr val="0070C0"/>
-                </a:solidFill>
-              </a:rPr>
-              <a:t>Atividades</a:t>
-            </a:r>
-            <a:endParaRPr lang="en-US" b="1" dirty="0">
-              <a:solidFill>
-                <a:srgbClr val="0070C0"/>
-              </a:solidFill>
-            </a:endParaRPr>
+              <a:t>+</a:t>
+            </a:r>
           </a:p>
         </p:txBody>
       </p:sp>
@@ -5864,8 +6036,8 @@
         </p:nvSpPr>
         <p:spPr>
           <a:xfrm>
-            <a:off x="139472" y="1063230"/>
-            <a:ext cx="8865056" cy="3606305"/>
+            <a:off x="142865" y="1200151"/>
+            <a:ext cx="8865056" cy="3394472"/>
           </a:xfrm>
         </p:spPr>
         <p:txBody>
@@ -5874,77 +6046,123 @@
           </a:bodyPr>
           <a:lstStyle/>
           <a:p>
-            <a:pPr algn="just">
-              <a:buFontTx/>
-              <a:buChar char="-"/>
-            </a:pPr>
-            <a:r>
-              <a:rPr lang="pt-BR" dirty="0">
-                <a:latin typeface="Times New Roman" panose="02020603050405020304" pitchFamily="18" charset="0"/>
-                <a:cs typeface="Times New Roman" panose="02020603050405020304" pitchFamily="18" charset="0"/>
-              </a:rPr>
-              <a:t>Exercícios de Fixação </a:t>
-            </a:r>
-            <a:r>
-              <a:rPr lang="pt-BR" b="1" dirty="0">
-                <a:latin typeface="Times New Roman" panose="02020603050405020304" pitchFamily="18" charset="0"/>
-                <a:cs typeface="Times New Roman" panose="02020603050405020304" pitchFamily="18" charset="0"/>
-              </a:rPr>
-              <a:t>JAVA</a:t>
-            </a:r>
-          </a:p>
-          <a:p>
             <a:pPr marL="0" indent="0" algn="just">
               <a:buNone/>
             </a:pPr>
-            <a:r>
-              <a:rPr lang="pt-BR" dirty="0">
-                <a:latin typeface="Times New Roman" panose="02020603050405020304" pitchFamily="18" charset="0"/>
-                <a:cs typeface="Times New Roman" panose="02020603050405020304" pitchFamily="18" charset="0"/>
-              </a:rPr>
-              <a:t>	</a:t>
-            </a:r>
+            <a:endParaRPr lang="pt-BR" sz="2400" dirty="0">
+              <a:latin typeface="Times New Roman" panose="02020603050405020304" pitchFamily="18" charset="0"/>
+              <a:cs typeface="Times New Roman" panose="02020603050405020304" pitchFamily="18" charset="0"/>
+            </a:endParaRPr>
           </a:p>
           <a:p>
             <a:pPr marL="0" indent="0" algn="just">
               <a:buNone/>
             </a:pPr>
             <a:r>
-              <a:rPr lang="pt-BR" b="1" dirty="0">
-                <a:solidFill>
-                  <a:srgbClr val="FF0000"/>
-                </a:solidFill>
-                <a:latin typeface="Times New Roman" panose="02020603050405020304" pitchFamily="18" charset="0"/>
-                <a:cs typeface="Times New Roman" panose="02020603050405020304" pitchFamily="18" charset="0"/>
-              </a:rPr>
-              <a:t>	Desafio em Sala de Aula</a:t>
-            </a:r>
-            <a:r>
-              <a:rPr lang="pt-BR" dirty="0">
-                <a:latin typeface="Times New Roman" panose="02020603050405020304" pitchFamily="18" charset="0"/>
-                <a:cs typeface="Times New Roman" panose="02020603050405020304" pitchFamily="18" charset="0"/>
-              </a:rPr>
-              <a:t>.</a:t>
-            </a:r>
+              <a:rPr lang="pt-BR" sz="2400" dirty="0">
+                <a:latin typeface="Times New Roman" panose="02020603050405020304" pitchFamily="18" charset="0"/>
+                <a:cs typeface="Times New Roman" panose="02020603050405020304" pitchFamily="18" charset="0"/>
+              </a:rPr>
+              <a:t>[1] </a:t>
+            </a:r>
+            <a:r>
+              <a:rPr lang="pt-BR" sz="2400" dirty="0">
+                <a:latin typeface="Times New Roman" panose="02020603050405020304" pitchFamily="18" charset="0"/>
+                <a:cs typeface="Times New Roman" panose="02020603050405020304" pitchFamily="18" charset="0"/>
+                <a:hlinkClick r:id="rId3"/>
+              </a:rPr>
+              <a:t>https://www.youtube.com/watch?v=QY0Kdg83orY</a:t>
+            </a:r>
+            <a:endParaRPr lang="pt-BR" sz="2400" dirty="0">
+              <a:latin typeface="Times New Roman" panose="02020603050405020304" pitchFamily="18" charset="0"/>
+              <a:cs typeface="Times New Roman" panose="02020603050405020304" pitchFamily="18" charset="0"/>
+            </a:endParaRPr>
           </a:p>
           <a:p>
             <a:pPr marL="0" indent="0" algn="just">
               <a:buNone/>
             </a:pPr>
-            <a:r>
-              <a:rPr lang="pt-BR" dirty="0">
-                <a:latin typeface="Times New Roman" panose="02020603050405020304" pitchFamily="18" charset="0"/>
-                <a:cs typeface="Times New Roman" panose="02020603050405020304" pitchFamily="18" charset="0"/>
-              </a:rPr>
-              <a:t>		</a:t>
-            </a:r>
+            <a:endParaRPr lang="pt-BR" sz="2400" dirty="0">
+              <a:latin typeface="Times New Roman" panose="02020603050405020304" pitchFamily="18" charset="0"/>
+              <a:cs typeface="Times New Roman" panose="02020603050405020304" pitchFamily="18" charset="0"/>
+            </a:endParaRPr>
           </a:p>
           <a:p>
             <a:pPr marL="0" indent="0" algn="just">
               <a:buNone/>
             </a:pPr>
-            <a:endParaRPr lang="pt-BR" dirty="0">
-              <a:latin typeface="Calibri" panose="020F0502020204030204" pitchFamily="34" charset="0"/>
+            <a:endParaRPr lang="pt-BR" sz="2400" dirty="0">
+              <a:latin typeface="Times New Roman" panose="02020603050405020304" pitchFamily="18" charset="0"/>
+              <a:cs typeface="Times New Roman" panose="02020603050405020304" pitchFamily="18" charset="0"/>
+            </a:endParaRPr>
+          </a:p>
+          <a:p>
+            <a:pPr marL="0" indent="0" algn="just">
+              <a:buNone/>
+            </a:pPr>
+            <a:endParaRPr lang="pt-BR" sz="2400" dirty="0">
+              <a:latin typeface="Times New Roman" panose="02020603050405020304" pitchFamily="18" charset="0"/>
+              <a:cs typeface="Times New Roman" panose="02020603050405020304" pitchFamily="18" charset="0"/>
+            </a:endParaRPr>
+          </a:p>
+          <a:p>
+            <a:pPr marL="0" indent="0" algn="just">
+              <a:buNone/>
+            </a:pPr>
+            <a:r>
+              <a:rPr lang="pt-BR" sz="2400" dirty="0">
+                <a:latin typeface="Times New Roman" panose="02020603050405020304" pitchFamily="18" charset="0"/>
+                <a:cs typeface="Times New Roman" panose="02020603050405020304" pitchFamily="18" charset="0"/>
+              </a:rPr>
+              <a:t>[2] </a:t>
+            </a:r>
+            <a:r>
+              <a:rPr lang="pt-BR" sz="2400" dirty="0">
+                <a:latin typeface="Times New Roman" panose="02020603050405020304" pitchFamily="18" charset="0"/>
+                <a:cs typeface="Times New Roman" panose="02020603050405020304" pitchFamily="18" charset="0"/>
+                <a:hlinkClick r:id="rId4"/>
+              </a:rPr>
+              <a:t>https://www.youtube.com/watch?v=aBhVJM31nBM</a:t>
+            </a:r>
+            <a:endParaRPr lang="pt-BR" sz="2400" dirty="0">
+              <a:latin typeface="Times New Roman" panose="02020603050405020304" pitchFamily="18" charset="0"/>
+              <a:cs typeface="Times New Roman" panose="02020603050405020304" pitchFamily="18" charset="0"/>
+            </a:endParaRPr>
+          </a:p>
+          <a:p>
+            <a:pPr marL="0" indent="0" algn="just">
+              <a:buNone/>
+            </a:pPr>
+            <a:endParaRPr lang="pt-BR" sz="2400" dirty="0">
+              <a:latin typeface="Times New Roman" panose="02020603050405020304" pitchFamily="18" charset="0"/>
+              <a:cs typeface="Times New Roman" panose="02020603050405020304" pitchFamily="18" charset="0"/>
+            </a:endParaRPr>
+          </a:p>
+          <a:p>
+            <a:pPr marL="0" indent="0" algn="just">
+              <a:buNone/>
+            </a:pPr>
+            <a:endParaRPr lang="pt-BR" sz="2400" dirty="0">
+              <a:latin typeface="Times New Roman" panose="02020603050405020304" pitchFamily="18" charset="0"/>
+              <a:cs typeface="Times New Roman" panose="02020603050405020304" pitchFamily="18" charset="0"/>
+            </a:endParaRPr>
+          </a:p>
+          <a:p>
+            <a:pPr marL="0" indent="0" algn="just">
+              <a:buNone/>
+            </a:pPr>
+            <a:endParaRPr lang="pt-BR" sz="2400" dirty="0">
+              <a:latin typeface="Times New Roman" panose="02020603050405020304" pitchFamily="18" charset="0"/>
+              <a:cs typeface="Times New Roman" panose="02020603050405020304" pitchFamily="18" charset="0"/>
+            </a:endParaRPr>
+          </a:p>
+          <a:p>
+            <a:pPr marL="0" indent="0" algn="just">
+              <a:buNone/>
+            </a:pPr>
+            <a:endParaRPr lang="pt-BR" sz="2400" dirty="0">
+              <a:latin typeface="Times New Roman" panose="02020603050405020304" pitchFamily="18" charset="0"/>
+              <a:cs typeface="Times New Roman" panose="02020603050405020304" pitchFamily="18" charset="0"/>
             </a:endParaRPr>
           </a:p>
         </p:txBody>
@@ -5952,7 +6170,7 @@
     </p:spTree>
     <p:extLst>
       <p:ext uri="{BB962C8B-B14F-4D97-AF65-F5344CB8AC3E}">
-        <p14:creationId xmlns:p14="http://schemas.microsoft.com/office/powerpoint/2010/main" val="2470652989"/>
+        <p14:creationId xmlns:p14="http://schemas.microsoft.com/office/powerpoint/2010/main" val="2747596967"/>
       </p:ext>
     </p:extLst>
   </p:cSld>
@@ -6008,6 +6226,188 @@
                   <a:srgbClr val="0070C0"/>
                 </a:solidFill>
               </a:rPr>
+              <a:t>Dinâmica</a:t>
+            </a:r>
+            <a:r>
+              <a:rPr lang="en-US" b="1" dirty="0">
+                <a:solidFill>
+                  <a:srgbClr val="0070C0"/>
+                </a:solidFill>
+              </a:rPr>
+              <a:t>/</a:t>
+            </a:r>
+            <a:r>
+              <a:rPr lang="en-US" b="1" dirty="0" err="1">
+                <a:solidFill>
+                  <a:srgbClr val="0070C0"/>
+                </a:solidFill>
+              </a:rPr>
+              <a:t>Atividades</a:t>
+            </a:r>
+            <a:endParaRPr lang="en-US" b="1" dirty="0">
+              <a:solidFill>
+                <a:srgbClr val="0070C0"/>
+              </a:solidFill>
+            </a:endParaRPr>
+          </a:p>
+        </p:txBody>
+      </p:sp>
+      <p:sp>
+        <p:nvSpPr>
+          <p:cNvPr id="8" name="Text Placeholder 2"/>
+          <p:cNvSpPr>
+            <a:spLocks noGrp="1"/>
+          </p:cNvSpPr>
+          <p:nvPr>
+            <p:ph type="body" sz="half" idx="1"/>
+          </p:nvPr>
+        </p:nvSpPr>
+        <p:spPr>
+          <a:xfrm>
+            <a:off x="139472" y="1063230"/>
+            <a:ext cx="8865056" cy="3606305"/>
+          </a:xfrm>
+        </p:spPr>
+        <p:txBody>
+          <a:bodyPr>
+            <a:noAutofit/>
+          </a:bodyPr>
+          <a:lstStyle/>
+          <a:p>
+            <a:pPr algn="just">
+              <a:buFontTx/>
+              <a:buChar char="-"/>
+            </a:pPr>
+            <a:r>
+              <a:rPr lang="pt-BR" dirty="0">
+                <a:latin typeface="Times New Roman" panose="02020603050405020304" pitchFamily="18" charset="0"/>
+                <a:cs typeface="Times New Roman" panose="02020603050405020304" pitchFamily="18" charset="0"/>
+              </a:rPr>
+              <a:t>Exercícios de Fixação </a:t>
+            </a:r>
+            <a:r>
+              <a:rPr lang="pt-BR" b="1" dirty="0">
+                <a:latin typeface="Times New Roman" panose="02020603050405020304" pitchFamily="18" charset="0"/>
+                <a:cs typeface="Times New Roman" panose="02020603050405020304" pitchFamily="18" charset="0"/>
+              </a:rPr>
+              <a:t>JAVA</a:t>
+            </a:r>
+          </a:p>
+          <a:p>
+            <a:pPr marL="0" indent="0" algn="just">
+              <a:buNone/>
+            </a:pPr>
+            <a:r>
+              <a:rPr lang="pt-BR" dirty="0">
+                <a:latin typeface="Times New Roman" panose="02020603050405020304" pitchFamily="18" charset="0"/>
+                <a:cs typeface="Times New Roman" panose="02020603050405020304" pitchFamily="18" charset="0"/>
+              </a:rPr>
+              <a:t>	</a:t>
+            </a:r>
+          </a:p>
+          <a:p>
+            <a:pPr marL="0" indent="0" algn="just">
+              <a:buNone/>
+            </a:pPr>
+            <a:r>
+              <a:rPr lang="pt-BR" b="1" dirty="0">
+                <a:solidFill>
+                  <a:srgbClr val="FF0000"/>
+                </a:solidFill>
+                <a:latin typeface="Times New Roman" panose="02020603050405020304" pitchFamily="18" charset="0"/>
+                <a:cs typeface="Times New Roman" panose="02020603050405020304" pitchFamily="18" charset="0"/>
+              </a:rPr>
+              <a:t>	Desafio em Sala de Aula</a:t>
+            </a:r>
+            <a:r>
+              <a:rPr lang="pt-BR" dirty="0">
+                <a:latin typeface="Times New Roman" panose="02020603050405020304" pitchFamily="18" charset="0"/>
+                <a:cs typeface="Times New Roman" panose="02020603050405020304" pitchFamily="18" charset="0"/>
+              </a:rPr>
+              <a:t>.</a:t>
+            </a:r>
+          </a:p>
+          <a:p>
+            <a:pPr marL="0" indent="0" algn="just">
+              <a:buNone/>
+            </a:pPr>
+            <a:r>
+              <a:rPr lang="pt-BR" dirty="0">
+                <a:latin typeface="Times New Roman" panose="02020603050405020304" pitchFamily="18" charset="0"/>
+                <a:cs typeface="Times New Roman" panose="02020603050405020304" pitchFamily="18" charset="0"/>
+              </a:rPr>
+              <a:t>		</a:t>
+            </a:r>
+          </a:p>
+          <a:p>
+            <a:pPr marL="0" indent="0" algn="just">
+              <a:buNone/>
+            </a:pPr>
+            <a:endParaRPr lang="pt-BR" dirty="0">
+              <a:latin typeface="Calibri" panose="020F0502020204030204" pitchFamily="34" charset="0"/>
+            </a:endParaRPr>
+          </a:p>
+        </p:txBody>
+      </p:sp>
+    </p:spTree>
+    <p:extLst>
+      <p:ext uri="{BB962C8B-B14F-4D97-AF65-F5344CB8AC3E}">
+        <p14:creationId xmlns:p14="http://schemas.microsoft.com/office/powerpoint/2010/main" val="2470652989"/>
+      </p:ext>
+    </p:extLst>
+  </p:cSld>
+  <p:clrMapOvr>
+    <a:masterClrMapping/>
+  </p:clrMapOvr>
+  <p:transition spd="med"/>
+</p:sld>
+</file>
+
+<file path=ppt/slides/slide18.xml><?xml version="1.0" encoding="utf-8"?>
+<p:sld xmlns:a="http://schemas.openxmlformats.org/drawingml/2006/main" xmlns:r="http://schemas.openxmlformats.org/officeDocument/2006/relationships" xmlns:p="http://schemas.openxmlformats.org/presentationml/2006/main">
+  <p:cSld>
+    <p:spTree>
+      <p:nvGrpSpPr>
+        <p:cNvPr id="1" name=""/>
+        <p:cNvGrpSpPr/>
+        <p:nvPr/>
+      </p:nvGrpSpPr>
+      <p:grpSpPr>
+        <a:xfrm>
+          <a:off x="0" y="0"/>
+          <a:ext cx="0" cy="0"/>
+          <a:chOff x="0" y="0"/>
+          <a:chExt cx="0" cy="0"/>
+        </a:xfrm>
+      </p:grpSpPr>
+      <p:sp>
+        <p:nvSpPr>
+          <p:cNvPr id="6" name="Title 1"/>
+          <p:cNvSpPr>
+            <a:spLocks noGrp="1"/>
+          </p:cNvSpPr>
+          <p:nvPr>
+            <p:ph type="title"/>
+          </p:nvPr>
+        </p:nvSpPr>
+        <p:spPr>
+          <a:xfrm>
+            <a:off x="457200" y="205980"/>
+            <a:ext cx="8229600" cy="857251"/>
+          </a:xfrm>
+        </p:spPr>
+        <p:txBody>
+          <a:bodyPr>
+            <a:normAutofit/>
+          </a:bodyPr>
+          <a:lstStyle/>
+          <a:p>
+            <a:r>
+              <a:rPr lang="en-US" b="1" dirty="0" err="1">
+                <a:solidFill>
+                  <a:srgbClr val="0070C0"/>
+                </a:solidFill>
+              </a:rPr>
               <a:t>Referências</a:t>
             </a:r>
             <a:r>
@@ -6155,7 +6555,7 @@
 </p:sld>
 </file>
 
-<file path=ppt/slides/slide18.xml><?xml version="1.0" encoding="utf-8"?>
+<file path=ppt/slides/slide19.xml><?xml version="1.0" encoding="utf-8"?>
 <p:sld xmlns:a="http://schemas.openxmlformats.org/drawingml/2006/main" xmlns:r="http://schemas.openxmlformats.org/officeDocument/2006/relationships" xmlns:p="http://schemas.openxmlformats.org/presentationml/2006/main">
   <p:cSld>
     <p:spTree>
@@ -8601,11 +9001,14 @@
               </a:rPr>
               <a:t>Arquitetural</a:t>
             </a:r>
-            <a:endParaRPr lang="en-US" b="1" dirty="0">
-              <a:solidFill>
-                <a:srgbClr val="0070C0"/>
-              </a:solidFill>
-            </a:endParaRPr>
+            <a:r>
+              <a:rPr lang="en-US" b="1" dirty="0">
+                <a:solidFill>
+                  <a:srgbClr val="0070C0"/>
+                </a:solidFill>
+              </a:rPr>
+              <a:t> MVC</a:t>
+            </a:r>
           </a:p>
         </p:txBody>
       </p:sp>
@@ -8622,7 +9025,7 @@
         <p:spPr>
           <a:xfrm>
             <a:off x="142865" y="1037312"/>
-            <a:ext cx="8865056" cy="3900208"/>
+            <a:ext cx="8865056" cy="3950312"/>
           </a:xfrm>
         </p:spPr>
         <p:txBody>
@@ -8641,6 +9044,205 @@
               <a:latin typeface="Times New Roman" panose="02020603050405020304" pitchFamily="18" charset="0"/>
               <a:cs typeface="Times New Roman" panose="02020603050405020304" pitchFamily="18" charset="0"/>
             </a:endParaRPr>
+          </a:p>
+          <a:p>
+            <a:pPr marL="0" indent="0" algn="just">
+              <a:buNone/>
+            </a:pPr>
+            <a:endParaRPr lang="pt-BR" sz="2400" dirty="0">
+              <a:solidFill>
+                <a:schemeClr val="tx1"/>
+              </a:solidFill>
+              <a:latin typeface="Times New Roman" panose="02020603050405020304" pitchFamily="18" charset="0"/>
+              <a:cs typeface="Times New Roman" panose="02020603050405020304" pitchFamily="18" charset="0"/>
+            </a:endParaRPr>
+          </a:p>
+          <a:p>
+            <a:pPr marL="0" indent="0" algn="just">
+              <a:buNone/>
+            </a:pPr>
+            <a:endParaRPr lang="pt-BR" sz="2400" dirty="0">
+              <a:solidFill>
+                <a:schemeClr val="tx1"/>
+              </a:solidFill>
+              <a:latin typeface="Times New Roman" panose="02020603050405020304" pitchFamily="18" charset="0"/>
+              <a:cs typeface="Times New Roman" panose="02020603050405020304" pitchFamily="18" charset="0"/>
+            </a:endParaRPr>
+          </a:p>
+          <a:p>
+            <a:pPr marL="0" indent="0" algn="just">
+              <a:buNone/>
+            </a:pPr>
+            <a:endParaRPr lang="pt-BR" sz="2400" dirty="0">
+              <a:solidFill>
+                <a:schemeClr val="tx1"/>
+              </a:solidFill>
+              <a:latin typeface="Times New Roman" panose="02020603050405020304" pitchFamily="18" charset="0"/>
+              <a:cs typeface="Times New Roman" panose="02020603050405020304" pitchFamily="18" charset="0"/>
+            </a:endParaRPr>
+          </a:p>
+          <a:p>
+            <a:pPr marL="0" indent="0" algn="just">
+              <a:buNone/>
+            </a:pPr>
+            <a:endParaRPr lang="pt-BR" sz="2400" dirty="0">
+              <a:solidFill>
+                <a:schemeClr val="tx1"/>
+              </a:solidFill>
+              <a:latin typeface="Times New Roman" panose="02020603050405020304" pitchFamily="18" charset="0"/>
+              <a:cs typeface="Times New Roman" panose="02020603050405020304" pitchFamily="18" charset="0"/>
+            </a:endParaRPr>
+          </a:p>
+          <a:p>
+            <a:pPr marL="0" indent="0" algn="just">
+              <a:buNone/>
+            </a:pPr>
+            <a:endParaRPr lang="pt-BR" sz="2400" dirty="0">
+              <a:solidFill>
+                <a:schemeClr val="tx1"/>
+              </a:solidFill>
+              <a:latin typeface="Times New Roman" panose="02020603050405020304" pitchFamily="18" charset="0"/>
+              <a:cs typeface="Times New Roman" panose="02020603050405020304" pitchFamily="18" charset="0"/>
+            </a:endParaRPr>
+          </a:p>
+          <a:p>
+            <a:pPr marL="0" indent="0" algn="just">
+              <a:buNone/>
+            </a:pPr>
+            <a:endParaRPr lang="pt-BR" sz="2400" dirty="0">
+              <a:solidFill>
+                <a:schemeClr val="tx1"/>
+              </a:solidFill>
+              <a:latin typeface="Times New Roman" panose="02020603050405020304" pitchFamily="18" charset="0"/>
+              <a:cs typeface="Times New Roman" panose="02020603050405020304" pitchFamily="18" charset="0"/>
+            </a:endParaRPr>
+          </a:p>
+          <a:p>
+            <a:pPr marL="0" indent="0" algn="just">
+              <a:buNone/>
+            </a:pPr>
+            <a:r>
+              <a:rPr lang="pt-BR" sz="1400" dirty="0" err="1">
+                <a:solidFill>
+                  <a:schemeClr val="tx1"/>
+                </a:solidFill>
+                <a:latin typeface="Times New Roman" panose="02020603050405020304" pitchFamily="18" charset="0"/>
+                <a:cs typeface="Times New Roman" panose="02020603050405020304" pitchFamily="18" charset="0"/>
+              </a:rPr>
+              <a:t>Controller</a:t>
+            </a:r>
+            <a:r>
+              <a:rPr lang="pt-BR" sz="1400" dirty="0">
+                <a:solidFill>
+                  <a:schemeClr val="tx1"/>
+                </a:solidFill>
+                <a:latin typeface="Times New Roman" panose="02020603050405020304" pitchFamily="18" charset="0"/>
+                <a:cs typeface="Times New Roman" panose="02020603050405020304" pitchFamily="18" charset="0"/>
+              </a:rPr>
+              <a:t>(</a:t>
+            </a:r>
+            <a:r>
+              <a:rPr lang="pt-BR" sz="1400" b="1" dirty="0">
+                <a:solidFill>
+                  <a:srgbClr val="FF0000"/>
+                </a:solidFill>
+                <a:latin typeface="Times New Roman" panose="02020603050405020304" pitchFamily="18" charset="0"/>
+                <a:cs typeface="Times New Roman" panose="02020603050405020304" pitchFamily="18" charset="0"/>
+              </a:rPr>
+              <a:t>API REST</a:t>
+            </a:r>
+            <a:r>
+              <a:rPr lang="pt-BR" sz="1400" dirty="0">
+                <a:solidFill>
+                  <a:schemeClr val="tx1"/>
+                </a:solidFill>
+                <a:latin typeface="Times New Roman" panose="02020603050405020304" pitchFamily="18" charset="0"/>
+                <a:cs typeface="Times New Roman" panose="02020603050405020304" pitchFamily="18" charset="0"/>
+              </a:rPr>
+              <a:t>); </a:t>
+            </a:r>
+            <a:r>
+              <a:rPr lang="pt-BR" sz="1400" dirty="0" err="1">
+                <a:solidFill>
+                  <a:schemeClr val="tx1"/>
+                </a:solidFill>
+                <a:latin typeface="Times New Roman" panose="02020603050405020304" pitchFamily="18" charset="0"/>
+                <a:cs typeface="Times New Roman" panose="02020603050405020304" pitchFamily="18" charset="0"/>
+              </a:rPr>
+              <a:t>View</a:t>
+            </a:r>
+            <a:r>
+              <a:rPr lang="pt-BR" sz="1400" dirty="0">
+                <a:solidFill>
+                  <a:schemeClr val="tx1"/>
+                </a:solidFill>
+                <a:latin typeface="Times New Roman" panose="02020603050405020304" pitchFamily="18" charset="0"/>
+                <a:cs typeface="Times New Roman" panose="02020603050405020304" pitchFamily="18" charset="0"/>
+              </a:rPr>
+              <a:t>(JSON; </a:t>
+            </a:r>
+            <a:r>
+              <a:rPr lang="pt-BR" sz="1400" dirty="0" err="1">
+                <a:solidFill>
+                  <a:schemeClr val="tx1"/>
+                </a:solidFill>
+                <a:latin typeface="Times New Roman" panose="02020603050405020304" pitchFamily="18" charset="0"/>
+                <a:cs typeface="Times New Roman" panose="02020603050405020304" pitchFamily="18" charset="0"/>
+              </a:rPr>
+              <a:t>schemas</a:t>
+            </a:r>
+            <a:r>
+              <a:rPr lang="pt-BR" sz="1400" dirty="0">
+                <a:solidFill>
+                  <a:schemeClr val="tx1"/>
+                </a:solidFill>
+                <a:latin typeface="Times New Roman" panose="02020603050405020304" pitchFamily="18" charset="0"/>
+                <a:cs typeface="Times New Roman" panose="02020603050405020304" pitchFamily="18" charset="0"/>
+              </a:rPr>
+              <a:t>, XML); Model(entidades, RN, persistência). – </a:t>
+            </a:r>
+            <a:r>
+              <a:rPr lang="pt-BR" sz="1400" b="1" dirty="0" err="1">
+                <a:solidFill>
+                  <a:srgbClr val="FF0000"/>
+                </a:solidFill>
+                <a:latin typeface="Times New Roman" panose="02020603050405020304" pitchFamily="18" charset="0"/>
+                <a:cs typeface="Times New Roman" panose="02020603050405020304" pitchFamily="18" charset="0"/>
+              </a:rPr>
+              <a:t>backend</a:t>
+            </a:r>
+            <a:endParaRPr lang="pt-BR" sz="1200" b="1" dirty="0">
+              <a:solidFill>
+                <a:srgbClr val="FF0000"/>
+              </a:solidFill>
+              <a:latin typeface="Times New Roman" panose="02020603050405020304" pitchFamily="18" charset="0"/>
+              <a:cs typeface="Times New Roman" panose="02020603050405020304" pitchFamily="18" charset="0"/>
+            </a:endParaRPr>
+          </a:p>
+          <a:p>
+            <a:pPr marL="0" indent="0" algn="just">
+              <a:buNone/>
+            </a:pPr>
+            <a:r>
+              <a:rPr lang="pt-BR" sz="1400" b="1" dirty="0">
+                <a:solidFill>
+                  <a:srgbClr val="FF0000"/>
+                </a:solidFill>
+                <a:latin typeface="Times New Roman" panose="02020603050405020304" pitchFamily="18" charset="0"/>
+                <a:cs typeface="Times New Roman" panose="02020603050405020304" pitchFamily="18" charset="0"/>
+              </a:rPr>
+              <a:t>Veja</a:t>
+            </a:r>
+            <a:r>
+              <a:rPr lang="pt-BR" sz="1200" dirty="0">
+                <a:solidFill>
+                  <a:schemeClr val="tx1"/>
+                </a:solidFill>
+                <a:latin typeface="Times New Roman" panose="02020603050405020304" pitchFamily="18" charset="0"/>
+                <a:cs typeface="Times New Roman" panose="02020603050405020304" pitchFamily="18" charset="0"/>
+              </a:rPr>
+              <a:t>: https://edisciplinas.usp.br/pluginfile.php/4632609/mod_resource/content/1/5%20Arquitetura%20MVC.pdf</a:t>
+            </a:r>
           </a:p>
         </p:txBody>
       </p:sp>
@@ -8672,7 +9274,7 @@
         </p:blipFill>
         <p:spPr>
           <a:xfrm>
-            <a:off x="241847" y="1159051"/>
+            <a:off x="241847" y="996213"/>
             <a:ext cx="7718811" cy="3153497"/>
           </a:xfrm>
           <a:prstGeom prst="rect">
@@ -8765,11 +9367,14 @@
               </a:rPr>
               <a:t>Arquitetural</a:t>
             </a:r>
-            <a:endParaRPr lang="en-US" b="1" dirty="0">
-              <a:solidFill>
-                <a:srgbClr val="0070C0"/>
-              </a:solidFill>
-            </a:endParaRPr>
+            <a:r>
+              <a:rPr lang="en-US" b="1" dirty="0">
+                <a:solidFill>
+                  <a:srgbClr val="0070C0"/>
+                </a:solidFill>
+              </a:rPr>
+              <a:t> MVC</a:t>
+            </a:r>
           </a:p>
         </p:txBody>
       </p:sp>
@@ -8887,13 +9492,13 @@
         </p:nvSpPr>
         <p:spPr>
           <a:xfrm>
-            <a:off x="457200" y="155876"/>
+            <a:off x="457200" y="205980"/>
             <a:ext cx="8229600" cy="857251"/>
           </a:xfrm>
         </p:spPr>
         <p:txBody>
           <a:bodyPr>
-            <a:normAutofit/>
+            <a:normAutofit fontScale="90000"/>
           </a:bodyPr>
           <a:lstStyle/>
           <a:p>
@@ -8903,8 +9508,37 @@
                   <a:srgbClr val="0070C0"/>
                 </a:solidFill>
               </a:rPr>
-              <a:t>JAVA – OO</a:t>
-            </a:r>
+              <a:t>JAVA – </a:t>
+            </a:r>
+            <a:r>
+              <a:rPr lang="en-US" b="1" dirty="0" err="1">
+                <a:solidFill>
+                  <a:srgbClr val="0070C0"/>
+                </a:solidFill>
+              </a:rPr>
+              <a:t>Estrutura</a:t>
+            </a:r>
+            <a:r>
+              <a:rPr lang="en-US" b="1" dirty="0">
+                <a:solidFill>
+                  <a:srgbClr val="0070C0"/>
+                </a:solidFill>
+              </a:rPr>
+              <a:t> de Pastas </a:t>
+            </a:r>
+            <a:r>
+              <a:rPr lang="en-US" b="1" dirty="0" err="1">
+                <a:solidFill>
+                  <a:srgbClr val="0070C0"/>
+                </a:solidFill>
+              </a:rPr>
+              <a:t>Exemplo</a:t>
+            </a:r>
+            <a:endParaRPr lang="en-US" b="1" dirty="0">
+              <a:solidFill>
+                <a:srgbClr val="0070C0"/>
+              </a:solidFill>
+            </a:endParaRPr>
           </a:p>
         </p:txBody>
       </p:sp>
@@ -8930,35 +9564,200 @@
           </a:bodyPr>
           <a:lstStyle/>
           <a:p>
-            <a:pPr marL="0" indent="0" algn="just">
-              <a:buNone/>
+            <a:pPr algn="just">
+              <a:buAutoNum type="arabicPeriod"/>
             </a:pPr>
             <a:r>
-              <a:rPr lang="pt-BR" sz="2400" b="1" dirty="0">
+              <a:rPr lang="pt-BR" sz="1400" b="1" dirty="0">
                 <a:solidFill>
                   <a:srgbClr val="FF0000"/>
                 </a:solidFill>
                 <a:latin typeface="Times New Roman" panose="02020603050405020304" pitchFamily="18" charset="0"/>
                 <a:cs typeface="Times New Roman" panose="02020603050405020304" pitchFamily="18" charset="0"/>
               </a:rPr>
-              <a:t>Orientação a objetos </a:t>
-            </a:r>
-            <a:r>
-              <a:rPr lang="pt-BR" sz="2400" dirty="0">
-                <a:solidFill>
-                  <a:schemeClr val="tx1"/>
-                </a:solidFill>
-                <a:latin typeface="Times New Roman" panose="02020603050405020304" pitchFamily="18" charset="0"/>
-                <a:cs typeface="Times New Roman" panose="02020603050405020304" pitchFamily="18" charset="0"/>
-              </a:rPr>
-              <a:t>é um paradigma aplicado na programação que consiste na interação entre diversas unidades chamadas de objetos.</a:t>
-            </a:r>
-          </a:p>
-          <a:p>
-            <a:pPr marL="0" indent="0" algn="just">
-              <a:buNone/>
-            </a:pPr>
-            <a:endParaRPr lang="pt-BR" sz="2400" dirty="0">
+              <a:t>MVC</a:t>
+            </a:r>
+            <a:r>
+              <a:rPr lang="pt-BR" sz="1400" dirty="0">
+                <a:solidFill>
+                  <a:schemeClr val="tx1"/>
+                </a:solidFill>
+                <a:latin typeface="Times New Roman" panose="02020603050405020304" pitchFamily="18" charset="0"/>
+                <a:cs typeface="Times New Roman" panose="02020603050405020304" pitchFamily="18" charset="0"/>
+              </a:rPr>
+              <a:t> (.</a:t>
+            </a:r>
+            <a:r>
+              <a:rPr lang="pt-BR" sz="1400" dirty="0" err="1">
+                <a:solidFill>
+                  <a:schemeClr val="tx1"/>
+                </a:solidFill>
+                <a:latin typeface="Times New Roman" panose="02020603050405020304" pitchFamily="18" charset="0"/>
+                <a:cs typeface="Times New Roman" panose="02020603050405020304" pitchFamily="18" charset="0"/>
+              </a:rPr>
+              <a:t>gitigone</a:t>
+            </a:r>
+            <a:r>
+              <a:rPr lang="pt-BR" sz="1400" dirty="0">
+                <a:solidFill>
+                  <a:schemeClr val="tx1"/>
+                </a:solidFill>
+                <a:latin typeface="Times New Roman" panose="02020603050405020304" pitchFamily="18" charset="0"/>
+                <a:cs typeface="Times New Roman" panose="02020603050405020304" pitchFamily="18" charset="0"/>
+              </a:rPr>
+              <a:t>; .</a:t>
+            </a:r>
+            <a:r>
+              <a:rPr lang="pt-BR" sz="1400" dirty="0" err="1">
+                <a:solidFill>
+                  <a:schemeClr val="tx1"/>
+                </a:solidFill>
+                <a:latin typeface="Times New Roman" panose="02020603050405020304" pitchFamily="18" charset="0"/>
+                <a:cs typeface="Times New Roman" panose="02020603050405020304" pitchFamily="18" charset="0"/>
+              </a:rPr>
+              <a:t>htaccess</a:t>
+            </a:r>
+            <a:r>
+              <a:rPr lang="pt-BR" sz="1400" dirty="0">
+                <a:solidFill>
+                  <a:schemeClr val="tx1"/>
+                </a:solidFill>
+                <a:latin typeface="Times New Roman" panose="02020603050405020304" pitchFamily="18" charset="0"/>
+                <a:cs typeface="Times New Roman" panose="02020603050405020304" pitchFamily="18" charset="0"/>
+              </a:rPr>
+              <a:t>; .</a:t>
+            </a:r>
+            <a:r>
+              <a:rPr lang="pt-BR" sz="1400" dirty="0" err="1">
+                <a:solidFill>
+                  <a:schemeClr val="tx1"/>
+                </a:solidFill>
+                <a:latin typeface="Times New Roman" panose="02020603050405020304" pitchFamily="18" charset="0"/>
+                <a:cs typeface="Times New Roman" panose="02020603050405020304" pitchFamily="18" charset="0"/>
+              </a:rPr>
+              <a:t>env</a:t>
+            </a:r>
+            <a:r>
+              <a:rPr lang="pt-BR" sz="1400" dirty="0">
+                <a:solidFill>
+                  <a:schemeClr val="tx1"/>
+                </a:solidFill>
+                <a:latin typeface="Times New Roman" panose="02020603050405020304" pitchFamily="18" charset="0"/>
+                <a:cs typeface="Times New Roman" panose="02020603050405020304" pitchFamily="18" charset="0"/>
+              </a:rPr>
+              <a:t>; .</a:t>
+            </a:r>
+            <a:r>
+              <a:rPr lang="pt-BR" sz="1400" dirty="0" err="1">
+                <a:solidFill>
+                  <a:schemeClr val="tx1"/>
+                </a:solidFill>
+                <a:latin typeface="Times New Roman" panose="02020603050405020304" pitchFamily="18" charset="0"/>
+                <a:cs typeface="Times New Roman" panose="02020603050405020304" pitchFamily="18" charset="0"/>
+              </a:rPr>
+              <a:t>env.example</a:t>
+            </a:r>
+            <a:r>
+              <a:rPr lang="pt-BR" sz="1400" dirty="0">
+                <a:solidFill>
+                  <a:schemeClr val="tx1"/>
+                </a:solidFill>
+                <a:latin typeface="Times New Roman" panose="02020603050405020304" pitchFamily="18" charset="0"/>
+                <a:cs typeface="Times New Roman" panose="02020603050405020304" pitchFamily="18" charset="0"/>
+              </a:rPr>
+              <a:t>; .</a:t>
+            </a:r>
+            <a:r>
+              <a:rPr lang="pt-BR" sz="1400" dirty="0" err="1">
+                <a:solidFill>
+                  <a:schemeClr val="tx1"/>
+                </a:solidFill>
+                <a:latin typeface="Times New Roman" panose="02020603050405020304" pitchFamily="18" charset="0"/>
+                <a:cs typeface="Times New Roman" panose="02020603050405020304" pitchFamily="18" charset="0"/>
+              </a:rPr>
+              <a:t>git</a:t>
+            </a:r>
+            <a:r>
+              <a:rPr lang="pt-BR" sz="1400" dirty="0">
+                <a:solidFill>
+                  <a:schemeClr val="tx1"/>
+                </a:solidFill>
+                <a:latin typeface="Times New Roman" panose="02020603050405020304" pitchFamily="18" charset="0"/>
+                <a:cs typeface="Times New Roman" panose="02020603050405020304" pitchFamily="18" charset="0"/>
+              </a:rPr>
+              <a:t>; </a:t>
+            </a:r>
+            <a:r>
+              <a:rPr lang="pt-BR" sz="1400" dirty="0" err="1">
+                <a:solidFill>
+                  <a:schemeClr val="tx1"/>
+                </a:solidFill>
+                <a:latin typeface="Times New Roman" panose="02020603050405020304" pitchFamily="18" charset="0"/>
+                <a:cs typeface="Times New Roman" panose="02020603050405020304" pitchFamily="18" charset="0"/>
+              </a:rPr>
+              <a:t>composer.json</a:t>
+            </a:r>
+            <a:r>
+              <a:rPr lang="pt-BR" sz="1400" dirty="0">
+                <a:solidFill>
+                  <a:schemeClr val="tx1"/>
+                </a:solidFill>
+                <a:latin typeface="Times New Roman" panose="02020603050405020304" pitchFamily="18" charset="0"/>
+                <a:cs typeface="Times New Roman" panose="02020603050405020304" pitchFamily="18" charset="0"/>
+              </a:rPr>
+              <a:t>; </a:t>
+            </a:r>
+            <a:r>
+              <a:rPr lang="pt-BR" sz="1400" dirty="0" err="1">
+                <a:solidFill>
+                  <a:schemeClr val="tx1"/>
+                </a:solidFill>
+                <a:latin typeface="Times New Roman" panose="02020603050405020304" pitchFamily="18" charset="0"/>
+                <a:cs typeface="Times New Roman" panose="02020603050405020304" pitchFamily="18" charset="0"/>
+              </a:rPr>
+              <a:t>composer.lock</a:t>
+            </a:r>
+            <a:r>
+              <a:rPr lang="pt-BR" sz="1400" dirty="0">
+                <a:solidFill>
+                  <a:schemeClr val="tx1"/>
+                </a:solidFill>
+                <a:latin typeface="Times New Roman" panose="02020603050405020304" pitchFamily="18" charset="0"/>
+                <a:cs typeface="Times New Roman" panose="02020603050405020304" pitchFamily="18" charset="0"/>
+              </a:rPr>
+              <a:t>; </a:t>
+            </a:r>
+            <a:r>
+              <a:rPr lang="pt-BR" sz="1400" dirty="0" err="1">
+                <a:solidFill>
+                  <a:schemeClr val="tx1"/>
+                </a:solidFill>
+                <a:latin typeface="Times New Roman" panose="02020603050405020304" pitchFamily="18" charset="0"/>
+                <a:cs typeface="Times New Roman" panose="02020603050405020304" pitchFamily="18" charset="0"/>
+              </a:rPr>
+              <a:t>database;sql</a:t>
+            </a:r>
+            <a:r>
+              <a:rPr lang="pt-BR" sz="1400" dirty="0">
+                <a:solidFill>
+                  <a:schemeClr val="tx1"/>
+                </a:solidFill>
+                <a:latin typeface="Times New Roman" panose="02020603050405020304" pitchFamily="18" charset="0"/>
+                <a:cs typeface="Times New Roman" panose="02020603050405020304" pitchFamily="18" charset="0"/>
+              </a:rPr>
+              <a:t>; </a:t>
+            </a:r>
+            <a:r>
+              <a:rPr lang="pt-BR" sz="1400" dirty="0" err="1">
+                <a:solidFill>
+                  <a:schemeClr val="tx1"/>
+                </a:solidFill>
+                <a:latin typeface="Times New Roman" panose="02020603050405020304" pitchFamily="18" charset="0"/>
+                <a:cs typeface="Times New Roman" panose="02020603050405020304" pitchFamily="18" charset="0"/>
+              </a:rPr>
+              <a:t>index.php</a:t>
+            </a:r>
+            <a:endParaRPr lang="pt-BR" sz="1400" dirty="0">
               <a:solidFill>
                 <a:schemeClr val="tx1"/>
               </a:solidFill>
@@ -8967,10 +9766,555 @@
             </a:endParaRPr>
           </a:p>
           <a:p>
-            <a:pPr marL="0" indent="0" algn="just">
-              <a:buNone/>
+            <a:pPr lvl="1" algn="just">
+              <a:buAutoNum type="arabicPeriod"/>
             </a:pPr>
-            <a:endParaRPr lang="pt-BR" sz="2400" dirty="0">
+            <a:r>
+              <a:rPr lang="pt-BR" sz="1400" b="1" dirty="0">
+                <a:solidFill>
+                  <a:schemeClr val="tx1"/>
+                </a:solidFill>
+                <a:latin typeface="Times New Roman" panose="02020603050405020304" pitchFamily="18" charset="0"/>
+                <a:cs typeface="Times New Roman" panose="02020603050405020304" pitchFamily="18" charset="0"/>
+              </a:rPr>
+              <a:t>App</a:t>
+            </a:r>
+          </a:p>
+          <a:p>
+            <a:pPr lvl="2" algn="just">
+              <a:buAutoNum type="arabicPeriod"/>
+            </a:pPr>
+            <a:r>
+              <a:rPr lang="pt-BR" sz="1400" b="1" dirty="0" err="1">
+                <a:solidFill>
+                  <a:srgbClr val="FF0000"/>
+                </a:solidFill>
+                <a:latin typeface="Times New Roman" panose="02020603050405020304" pitchFamily="18" charset="0"/>
+                <a:cs typeface="Times New Roman" panose="02020603050405020304" pitchFamily="18" charset="0"/>
+              </a:rPr>
+              <a:t>Controller</a:t>
+            </a:r>
+            <a:r>
+              <a:rPr lang="pt-BR" sz="1400" dirty="0">
+                <a:solidFill>
+                  <a:schemeClr val="tx1"/>
+                </a:solidFill>
+                <a:latin typeface="Times New Roman" panose="02020603050405020304" pitchFamily="18" charset="0"/>
+                <a:cs typeface="Times New Roman" panose="02020603050405020304" pitchFamily="18" charset="0"/>
+              </a:rPr>
+              <a:t> (</a:t>
+            </a:r>
+            <a:r>
+              <a:rPr lang="pt-BR" sz="1400" dirty="0" err="1">
+                <a:solidFill>
+                  <a:schemeClr val="tx1"/>
+                </a:solidFill>
+                <a:latin typeface="Times New Roman" panose="02020603050405020304" pitchFamily="18" charset="0"/>
+                <a:cs typeface="Times New Roman" panose="02020603050405020304" pitchFamily="18" charset="0"/>
+              </a:rPr>
+              <a:t>clienteController.php</a:t>
+            </a:r>
+            <a:r>
+              <a:rPr lang="pt-BR" sz="1400" dirty="0">
+                <a:solidFill>
+                  <a:schemeClr val="tx1"/>
+                </a:solidFill>
+                <a:latin typeface="Times New Roman" panose="02020603050405020304" pitchFamily="18" charset="0"/>
+                <a:cs typeface="Times New Roman" panose="02020603050405020304" pitchFamily="18" charset="0"/>
+              </a:rPr>
+              <a:t>, </a:t>
+            </a:r>
+            <a:r>
+              <a:rPr lang="pt-BR" sz="1400" dirty="0" err="1">
+                <a:solidFill>
+                  <a:schemeClr val="tx1"/>
+                </a:solidFill>
+                <a:latin typeface="Times New Roman" panose="02020603050405020304" pitchFamily="18" charset="0"/>
+                <a:cs typeface="Times New Roman" panose="02020603050405020304" pitchFamily="18" charset="0"/>
+              </a:rPr>
+              <a:t>fornecedorConttroller.php</a:t>
+            </a:r>
+            <a:r>
+              <a:rPr lang="pt-BR" sz="1400" dirty="0">
+                <a:solidFill>
+                  <a:schemeClr val="tx1"/>
+                </a:solidFill>
+                <a:latin typeface="Times New Roman" panose="02020603050405020304" pitchFamily="18" charset="0"/>
+                <a:cs typeface="Times New Roman" panose="02020603050405020304" pitchFamily="18" charset="0"/>
+              </a:rPr>
+              <a:t>, </a:t>
+            </a:r>
+            <a:r>
+              <a:rPr lang="pt-BR" sz="1400" dirty="0" err="1">
+                <a:solidFill>
+                  <a:schemeClr val="tx1"/>
+                </a:solidFill>
+                <a:latin typeface="Times New Roman" panose="02020603050405020304" pitchFamily="18" charset="0"/>
+                <a:cs typeface="Times New Roman" panose="02020603050405020304" pitchFamily="18" charset="0"/>
+              </a:rPr>
+              <a:t>etc</a:t>
+            </a:r>
+            <a:r>
+              <a:rPr lang="pt-BR" sz="1400" dirty="0">
+                <a:solidFill>
+                  <a:schemeClr val="tx1"/>
+                </a:solidFill>
+                <a:latin typeface="Times New Roman" panose="02020603050405020304" pitchFamily="18" charset="0"/>
+                <a:cs typeface="Times New Roman" panose="02020603050405020304" pitchFamily="18" charset="0"/>
+              </a:rPr>
+              <a:t>) (</a:t>
+            </a:r>
+            <a:r>
+              <a:rPr lang="pt-BR" sz="1400" b="1" dirty="0">
+                <a:solidFill>
+                  <a:schemeClr val="tx1"/>
+                </a:solidFill>
+                <a:latin typeface="Times New Roman" panose="02020603050405020304" pitchFamily="18" charset="0"/>
+                <a:cs typeface="Times New Roman" panose="02020603050405020304" pitchFamily="18" charset="0"/>
+              </a:rPr>
+              <a:t>gerenciador M/V</a:t>
+            </a:r>
+            <a:r>
+              <a:rPr lang="pt-BR" sz="1400" dirty="0">
+                <a:solidFill>
+                  <a:schemeClr val="tx1"/>
+                </a:solidFill>
+                <a:latin typeface="Times New Roman" panose="02020603050405020304" pitchFamily="18" charset="0"/>
+                <a:cs typeface="Times New Roman" panose="02020603050405020304" pitchFamily="18" charset="0"/>
+              </a:rPr>
+              <a:t>) </a:t>
+            </a:r>
+            <a:r>
+              <a:rPr lang="pt-BR" sz="1400" b="1" dirty="0">
+                <a:solidFill>
+                  <a:srgbClr val="FF0000"/>
+                </a:solidFill>
+                <a:latin typeface="Times New Roman" panose="02020603050405020304" pitchFamily="18" charset="0"/>
+                <a:cs typeface="Times New Roman" panose="02020603050405020304" pitchFamily="18" charset="0"/>
+              </a:rPr>
+              <a:t>API REST</a:t>
+            </a:r>
+          </a:p>
+          <a:p>
+            <a:pPr lvl="2" algn="just">
+              <a:buAutoNum type="arabicPeriod"/>
+            </a:pPr>
+            <a:r>
+              <a:rPr lang="pt-BR" sz="1400" b="1" dirty="0">
+                <a:solidFill>
+                  <a:srgbClr val="FF0000"/>
+                </a:solidFill>
+                <a:latin typeface="Times New Roman" panose="02020603050405020304" pitchFamily="18" charset="0"/>
+                <a:cs typeface="Times New Roman" panose="02020603050405020304" pitchFamily="18" charset="0"/>
+              </a:rPr>
+              <a:t>Model</a:t>
+            </a:r>
+            <a:r>
+              <a:rPr lang="pt-BR" sz="1400" dirty="0">
+                <a:solidFill>
+                  <a:schemeClr val="tx1"/>
+                </a:solidFill>
+                <a:latin typeface="Times New Roman" panose="02020603050405020304" pitchFamily="18" charset="0"/>
+                <a:cs typeface="Times New Roman" panose="02020603050405020304" pitchFamily="18" charset="0"/>
+              </a:rPr>
+              <a:t> (</a:t>
+            </a:r>
+            <a:r>
+              <a:rPr lang="pt-BR" sz="1400" dirty="0" err="1">
+                <a:solidFill>
+                  <a:schemeClr val="tx1"/>
+                </a:solidFill>
+                <a:latin typeface="Times New Roman" panose="02020603050405020304" pitchFamily="18" charset="0"/>
+                <a:cs typeface="Times New Roman" panose="02020603050405020304" pitchFamily="18" charset="0"/>
+              </a:rPr>
+              <a:t>clienteModel.php</a:t>
+            </a:r>
+            <a:r>
+              <a:rPr lang="pt-BR" sz="1400" dirty="0">
+                <a:solidFill>
+                  <a:schemeClr val="tx1"/>
+                </a:solidFill>
+                <a:latin typeface="Times New Roman" panose="02020603050405020304" pitchFamily="18" charset="0"/>
+                <a:cs typeface="Times New Roman" panose="02020603050405020304" pitchFamily="18" charset="0"/>
+              </a:rPr>
+              <a:t>, </a:t>
+            </a:r>
+            <a:r>
+              <a:rPr lang="pt-BR" sz="1400" dirty="0" err="1">
+                <a:solidFill>
+                  <a:schemeClr val="tx1"/>
+                </a:solidFill>
+                <a:latin typeface="Times New Roman" panose="02020603050405020304" pitchFamily="18" charset="0"/>
+                <a:cs typeface="Times New Roman" panose="02020603050405020304" pitchFamily="18" charset="0"/>
+              </a:rPr>
+              <a:t>fornecedorModel.php</a:t>
+            </a:r>
+            <a:r>
+              <a:rPr lang="pt-BR" sz="1400" dirty="0">
+                <a:solidFill>
+                  <a:schemeClr val="tx1"/>
+                </a:solidFill>
+                <a:latin typeface="Times New Roman" panose="02020603050405020304" pitchFamily="18" charset="0"/>
+                <a:cs typeface="Times New Roman" panose="02020603050405020304" pitchFamily="18" charset="0"/>
+              </a:rPr>
+              <a:t>, </a:t>
+            </a:r>
+            <a:r>
+              <a:rPr lang="pt-BR" sz="1400" dirty="0" err="1">
+                <a:solidFill>
+                  <a:schemeClr val="tx1"/>
+                </a:solidFill>
+                <a:latin typeface="Times New Roman" panose="02020603050405020304" pitchFamily="18" charset="0"/>
+                <a:cs typeface="Times New Roman" panose="02020603050405020304" pitchFamily="18" charset="0"/>
+              </a:rPr>
+              <a:t>etc</a:t>
+            </a:r>
+            <a:r>
+              <a:rPr lang="pt-BR" sz="1400" dirty="0">
+                <a:solidFill>
+                  <a:schemeClr val="tx1"/>
+                </a:solidFill>
+                <a:latin typeface="Times New Roman" panose="02020603050405020304" pitchFamily="18" charset="0"/>
+                <a:cs typeface="Times New Roman" panose="02020603050405020304" pitchFamily="18" charset="0"/>
+              </a:rPr>
+              <a:t>) (</a:t>
+            </a:r>
+            <a:r>
+              <a:rPr lang="pt-BR" sz="1400" b="1" dirty="0">
+                <a:solidFill>
+                  <a:schemeClr val="tx1"/>
+                </a:solidFill>
+                <a:latin typeface="Times New Roman" panose="02020603050405020304" pitchFamily="18" charset="0"/>
+                <a:cs typeface="Times New Roman" panose="02020603050405020304" pitchFamily="18" charset="0"/>
+              </a:rPr>
+              <a:t>DAO, </a:t>
+            </a:r>
+            <a:r>
+              <a:rPr lang="pt-BR" sz="1400" b="1" dirty="0" err="1">
+                <a:solidFill>
+                  <a:schemeClr val="tx1"/>
+                </a:solidFill>
+                <a:latin typeface="Times New Roman" panose="02020603050405020304" pitchFamily="18" charset="0"/>
+                <a:cs typeface="Times New Roman" panose="02020603050405020304" pitchFamily="18" charset="0"/>
+              </a:rPr>
+              <a:t>class</a:t>
+            </a:r>
+            <a:r>
+              <a:rPr lang="pt-BR" sz="1400" b="1" dirty="0">
+                <a:solidFill>
+                  <a:schemeClr val="tx1"/>
+                </a:solidFill>
+                <a:latin typeface="Times New Roman" panose="02020603050405020304" pitchFamily="18" charset="0"/>
+                <a:cs typeface="Times New Roman" panose="02020603050405020304" pitchFamily="18" charset="0"/>
+              </a:rPr>
+              <a:t>, regras de negócio, persistência.</a:t>
+            </a:r>
+            <a:r>
+              <a:rPr lang="pt-BR" sz="1400" dirty="0">
+                <a:solidFill>
+                  <a:schemeClr val="tx1"/>
+                </a:solidFill>
+                <a:latin typeface="Times New Roman" panose="02020603050405020304" pitchFamily="18" charset="0"/>
+                <a:cs typeface="Times New Roman" panose="02020603050405020304" pitchFamily="18" charset="0"/>
+              </a:rPr>
+              <a:t>)</a:t>
+            </a:r>
+          </a:p>
+          <a:p>
+            <a:pPr lvl="2" algn="just">
+              <a:buAutoNum type="arabicPeriod"/>
+            </a:pPr>
+            <a:r>
+              <a:rPr lang="pt-BR" sz="1400" dirty="0" err="1">
+                <a:solidFill>
+                  <a:schemeClr val="tx1"/>
+                </a:solidFill>
+                <a:latin typeface="Times New Roman" panose="02020603050405020304" pitchFamily="18" charset="0"/>
+                <a:cs typeface="Times New Roman" panose="02020603050405020304" pitchFamily="18" charset="0"/>
+              </a:rPr>
+              <a:t>Session</a:t>
+            </a:r>
+            <a:r>
+              <a:rPr lang="pt-BR" sz="1400" dirty="0">
+                <a:solidFill>
+                  <a:schemeClr val="tx1"/>
+                </a:solidFill>
+                <a:latin typeface="Times New Roman" panose="02020603050405020304" pitchFamily="18" charset="0"/>
+                <a:cs typeface="Times New Roman" panose="02020603050405020304" pitchFamily="18" charset="0"/>
+              </a:rPr>
+              <a:t> (</a:t>
+            </a:r>
+            <a:r>
+              <a:rPr lang="pt-BR" sz="1400" b="1" dirty="0">
+                <a:solidFill>
+                  <a:schemeClr val="tx1"/>
+                </a:solidFill>
+                <a:latin typeface="Times New Roman" panose="02020603050405020304" pitchFamily="18" charset="0"/>
+                <a:cs typeface="Times New Roman" panose="02020603050405020304" pitchFamily="18" charset="0"/>
+              </a:rPr>
+              <a:t>controle de sessão</a:t>
+            </a:r>
+            <a:r>
+              <a:rPr lang="pt-BR" sz="1400" dirty="0">
+                <a:solidFill>
+                  <a:schemeClr val="tx1"/>
+                </a:solidFill>
+                <a:latin typeface="Times New Roman" panose="02020603050405020304" pitchFamily="18" charset="0"/>
+                <a:cs typeface="Times New Roman" panose="02020603050405020304" pitchFamily="18" charset="0"/>
+              </a:rPr>
+              <a:t>)</a:t>
+            </a:r>
+          </a:p>
+          <a:p>
+            <a:pPr lvl="2" algn="just">
+              <a:buAutoNum type="arabicPeriod"/>
+            </a:pPr>
+            <a:r>
+              <a:rPr lang="pt-BR" sz="1400" dirty="0" err="1">
+                <a:solidFill>
+                  <a:schemeClr val="tx1"/>
+                </a:solidFill>
+                <a:latin typeface="Times New Roman" panose="02020603050405020304" pitchFamily="18" charset="0"/>
+                <a:cs typeface="Times New Roman" panose="02020603050405020304" pitchFamily="18" charset="0"/>
+              </a:rPr>
+              <a:t>Utils</a:t>
+            </a:r>
+            <a:r>
+              <a:rPr lang="pt-BR" sz="1400" dirty="0">
+                <a:solidFill>
+                  <a:schemeClr val="tx1"/>
+                </a:solidFill>
+                <a:latin typeface="Times New Roman" panose="02020603050405020304" pitchFamily="18" charset="0"/>
+                <a:cs typeface="Times New Roman" panose="02020603050405020304" pitchFamily="18" charset="0"/>
+              </a:rPr>
+              <a:t> (</a:t>
+            </a:r>
+            <a:r>
+              <a:rPr lang="pt-BR" sz="1400" b="1" dirty="0" err="1">
+                <a:solidFill>
+                  <a:schemeClr val="tx1"/>
+                </a:solidFill>
+                <a:latin typeface="Times New Roman" panose="02020603050405020304" pitchFamily="18" charset="0"/>
+                <a:cs typeface="Times New Roman" panose="02020603050405020304" pitchFamily="18" charset="0"/>
+              </a:rPr>
+              <a:t>funtions</a:t>
+            </a:r>
+            <a:r>
+              <a:rPr lang="pt-BR" sz="1400" dirty="0">
+                <a:solidFill>
+                  <a:schemeClr val="tx1"/>
+                </a:solidFill>
+                <a:latin typeface="Times New Roman" panose="02020603050405020304" pitchFamily="18" charset="0"/>
+                <a:cs typeface="Times New Roman" panose="02020603050405020304" pitchFamily="18" charset="0"/>
+              </a:rPr>
+              <a:t>) </a:t>
+            </a:r>
+          </a:p>
+          <a:p>
+            <a:pPr lvl="2" algn="just">
+              <a:buAutoNum type="arabicPeriod"/>
+            </a:pPr>
+            <a:r>
+              <a:rPr lang="pt-BR" sz="1400" b="1" dirty="0" err="1">
+                <a:solidFill>
+                  <a:srgbClr val="FF0000"/>
+                </a:solidFill>
+                <a:latin typeface="Times New Roman" panose="02020603050405020304" pitchFamily="18" charset="0"/>
+                <a:cs typeface="Times New Roman" panose="02020603050405020304" pitchFamily="18" charset="0"/>
+              </a:rPr>
+              <a:t>Schemas</a:t>
+            </a:r>
+            <a:r>
+              <a:rPr lang="pt-BR" sz="1400" b="1" dirty="0">
+                <a:solidFill>
+                  <a:srgbClr val="FF0000"/>
+                </a:solidFill>
+                <a:latin typeface="Times New Roman" panose="02020603050405020304" pitchFamily="18" charset="0"/>
+                <a:cs typeface="Times New Roman" panose="02020603050405020304" pitchFamily="18" charset="0"/>
+              </a:rPr>
+              <a:t>/</a:t>
+            </a:r>
+            <a:r>
+              <a:rPr lang="pt-BR" sz="1400" b="1" dirty="0" err="1">
+                <a:solidFill>
+                  <a:srgbClr val="FF0000"/>
+                </a:solidFill>
+                <a:latin typeface="Times New Roman" panose="02020603050405020304" pitchFamily="18" charset="0"/>
+                <a:cs typeface="Times New Roman" panose="02020603050405020304" pitchFamily="18" charset="0"/>
+              </a:rPr>
+              <a:t>templates</a:t>
+            </a:r>
+            <a:r>
+              <a:rPr lang="pt-BR" sz="1400" b="1" dirty="0">
+                <a:solidFill>
+                  <a:srgbClr val="FF0000"/>
+                </a:solidFill>
+                <a:latin typeface="Times New Roman" panose="02020603050405020304" pitchFamily="18" charset="0"/>
+                <a:cs typeface="Times New Roman" panose="02020603050405020304" pitchFamily="18" charset="0"/>
+              </a:rPr>
+              <a:t> </a:t>
+            </a:r>
+            <a:r>
+              <a:rPr lang="pt-BR" sz="1400" dirty="0">
+                <a:solidFill>
+                  <a:schemeClr val="tx1"/>
+                </a:solidFill>
+                <a:latin typeface="Times New Roman" panose="02020603050405020304" pitchFamily="18" charset="0"/>
+                <a:cs typeface="Times New Roman" panose="02020603050405020304" pitchFamily="18" charset="0"/>
+              </a:rPr>
+              <a:t>(</a:t>
+            </a:r>
+            <a:r>
+              <a:rPr lang="pt-BR" sz="1400" b="1" dirty="0" err="1">
+                <a:solidFill>
+                  <a:schemeClr val="tx1"/>
+                </a:solidFill>
+                <a:latin typeface="Times New Roman" panose="02020603050405020304" pitchFamily="18" charset="0"/>
+                <a:cs typeface="Times New Roman" panose="02020603050405020304" pitchFamily="18" charset="0"/>
+              </a:rPr>
+              <a:t>view</a:t>
+            </a:r>
+            <a:r>
+              <a:rPr lang="pt-BR" sz="1400" dirty="0">
+                <a:solidFill>
+                  <a:schemeClr val="tx1"/>
+                </a:solidFill>
+                <a:latin typeface="Times New Roman" panose="02020603050405020304" pitchFamily="18" charset="0"/>
+                <a:cs typeface="Times New Roman" panose="02020603050405020304" pitchFamily="18" charset="0"/>
+              </a:rPr>
+              <a:t>)</a:t>
+            </a:r>
+          </a:p>
+          <a:p>
+            <a:pPr lvl="2" algn="just">
+              <a:buAutoNum type="arabicPeriod"/>
+            </a:pPr>
+            <a:r>
+              <a:rPr lang="pt-BR" sz="1400" dirty="0">
+                <a:solidFill>
+                  <a:schemeClr val="tx1"/>
+                </a:solidFill>
+                <a:latin typeface="Times New Roman" panose="02020603050405020304" pitchFamily="18" charset="0"/>
+                <a:cs typeface="Times New Roman" panose="02020603050405020304" pitchFamily="18" charset="0"/>
+              </a:rPr>
+              <a:t>http</a:t>
+            </a:r>
+          </a:p>
+          <a:p>
+            <a:pPr lvl="3" algn="just">
+              <a:buAutoNum type="arabicPeriod"/>
+            </a:pPr>
+            <a:r>
+              <a:rPr lang="pt-BR" sz="1400" dirty="0">
+                <a:solidFill>
+                  <a:schemeClr val="tx1"/>
+                </a:solidFill>
+                <a:latin typeface="Times New Roman" panose="02020603050405020304" pitchFamily="18" charset="0"/>
+                <a:cs typeface="Times New Roman" panose="02020603050405020304" pitchFamily="18" charset="0"/>
+              </a:rPr>
+              <a:t>Middleware (</a:t>
+            </a:r>
+            <a:r>
+              <a:rPr lang="pt-BR" sz="1400" b="1" dirty="0">
+                <a:solidFill>
+                  <a:schemeClr val="tx1"/>
+                </a:solidFill>
+                <a:latin typeface="Times New Roman" panose="02020603050405020304" pitchFamily="18" charset="0"/>
+                <a:cs typeface="Times New Roman" panose="02020603050405020304" pitchFamily="18" charset="0"/>
+              </a:rPr>
+              <a:t>Aplicação apoio se necessário</a:t>
+            </a:r>
+            <a:r>
+              <a:rPr lang="pt-BR" sz="1400" dirty="0">
+                <a:solidFill>
+                  <a:schemeClr val="tx1"/>
+                </a:solidFill>
+                <a:latin typeface="Times New Roman" panose="02020603050405020304" pitchFamily="18" charset="0"/>
+                <a:cs typeface="Times New Roman" panose="02020603050405020304" pitchFamily="18" charset="0"/>
+              </a:rPr>
+              <a:t>)</a:t>
+            </a:r>
+          </a:p>
+          <a:p>
+            <a:pPr lvl="1" algn="just">
+              <a:buAutoNum type="arabicPeriod"/>
+            </a:pPr>
+            <a:r>
+              <a:rPr lang="pt-BR" sz="1400" dirty="0">
+                <a:solidFill>
+                  <a:schemeClr val="tx1"/>
+                </a:solidFill>
+                <a:latin typeface="Times New Roman" panose="02020603050405020304" pitchFamily="18" charset="0"/>
+                <a:cs typeface="Times New Roman" panose="02020603050405020304" pitchFamily="18" charset="0"/>
+              </a:rPr>
+              <a:t>Includes (</a:t>
+            </a:r>
+            <a:r>
+              <a:rPr lang="pt-BR" sz="1400" b="1" dirty="0">
+                <a:solidFill>
+                  <a:schemeClr val="tx1"/>
+                </a:solidFill>
+                <a:latin typeface="Times New Roman" panose="02020603050405020304" pitchFamily="18" charset="0"/>
+                <a:cs typeface="Times New Roman" panose="02020603050405020304" pitchFamily="18" charset="0"/>
+              </a:rPr>
+              <a:t>bibliotecas do projeto</a:t>
+            </a:r>
+            <a:r>
+              <a:rPr lang="pt-BR" sz="1400" dirty="0">
+                <a:solidFill>
+                  <a:schemeClr val="tx1"/>
+                </a:solidFill>
+                <a:latin typeface="Times New Roman" panose="02020603050405020304" pitchFamily="18" charset="0"/>
+                <a:cs typeface="Times New Roman" panose="02020603050405020304" pitchFamily="18" charset="0"/>
+              </a:rPr>
+              <a:t>)</a:t>
+            </a:r>
+          </a:p>
+          <a:p>
+            <a:pPr lvl="1" algn="just">
+              <a:buAutoNum type="arabicPeriod"/>
+            </a:pPr>
+            <a:r>
+              <a:rPr lang="pt-BR" sz="1400" dirty="0" err="1">
+                <a:solidFill>
+                  <a:schemeClr val="tx1"/>
+                </a:solidFill>
+                <a:latin typeface="Times New Roman" panose="02020603050405020304" pitchFamily="18" charset="0"/>
+                <a:cs typeface="Times New Roman" panose="02020603050405020304" pitchFamily="18" charset="0"/>
+              </a:rPr>
+              <a:t>Resources</a:t>
+            </a:r>
+            <a:r>
+              <a:rPr lang="pt-BR" sz="1400" dirty="0">
+                <a:solidFill>
+                  <a:schemeClr val="tx1"/>
+                </a:solidFill>
+                <a:latin typeface="Times New Roman" panose="02020603050405020304" pitchFamily="18" charset="0"/>
+                <a:cs typeface="Times New Roman" panose="02020603050405020304" pitchFamily="18" charset="0"/>
+              </a:rPr>
+              <a:t> (recursos da aplicação – </a:t>
+            </a:r>
+            <a:r>
+              <a:rPr lang="pt-BR" sz="1400" b="1" dirty="0" err="1">
+                <a:solidFill>
+                  <a:schemeClr val="tx1"/>
+                </a:solidFill>
+                <a:latin typeface="Times New Roman" panose="02020603050405020304" pitchFamily="18" charset="0"/>
+                <a:cs typeface="Times New Roman" panose="02020603050405020304" pitchFamily="18" charset="0"/>
+              </a:rPr>
+              <a:t>endpoints</a:t>
+            </a:r>
+            <a:r>
+              <a:rPr lang="pt-BR" sz="1400" b="1" dirty="0">
+                <a:solidFill>
+                  <a:schemeClr val="tx1"/>
+                </a:solidFill>
+                <a:latin typeface="Times New Roman" panose="02020603050405020304" pitchFamily="18" charset="0"/>
+                <a:cs typeface="Times New Roman" panose="02020603050405020304" pitchFamily="18" charset="0"/>
+              </a:rPr>
+              <a:t>)</a:t>
+            </a:r>
+            <a:endParaRPr lang="pt-BR" sz="1400" dirty="0">
               <a:solidFill>
                 <a:schemeClr val="tx1"/>
               </a:solidFill>
@@ -8978,48 +10322,138 @@
               <a:cs typeface="Times New Roman" panose="02020603050405020304" pitchFamily="18" charset="0"/>
             </a:endParaRPr>
           </a:p>
+          <a:p>
+            <a:pPr lvl="1" algn="just">
+              <a:buAutoNum type="arabicPeriod"/>
+            </a:pPr>
+            <a:r>
+              <a:rPr lang="pt-BR" sz="1400" dirty="0" err="1">
+                <a:solidFill>
+                  <a:schemeClr val="tx1"/>
+                </a:solidFill>
+                <a:latin typeface="Times New Roman" panose="02020603050405020304" pitchFamily="18" charset="0"/>
+                <a:cs typeface="Times New Roman" panose="02020603050405020304" pitchFamily="18" charset="0"/>
+              </a:rPr>
+              <a:t>Routes</a:t>
+            </a:r>
+            <a:r>
+              <a:rPr lang="pt-BR" sz="1400" dirty="0">
+                <a:solidFill>
+                  <a:schemeClr val="tx1"/>
+                </a:solidFill>
+                <a:latin typeface="Times New Roman" panose="02020603050405020304" pitchFamily="18" charset="0"/>
+                <a:cs typeface="Times New Roman" panose="02020603050405020304" pitchFamily="18" charset="0"/>
+              </a:rPr>
+              <a:t>  (</a:t>
+            </a:r>
+            <a:r>
+              <a:rPr lang="pt-BR" sz="1400" b="1" dirty="0" err="1">
+                <a:solidFill>
+                  <a:schemeClr val="tx1"/>
+                </a:solidFill>
+                <a:latin typeface="Times New Roman" panose="02020603050405020304" pitchFamily="18" charset="0"/>
+                <a:cs typeface="Times New Roman" panose="02020603050405020304" pitchFamily="18" charset="0"/>
+              </a:rPr>
+              <a:t>endpoints</a:t>
+            </a:r>
+            <a:r>
+              <a:rPr lang="pt-BR" sz="1400" dirty="0">
+                <a:solidFill>
+                  <a:schemeClr val="tx1"/>
+                </a:solidFill>
+                <a:latin typeface="Times New Roman" panose="02020603050405020304" pitchFamily="18" charset="0"/>
+                <a:cs typeface="Times New Roman" panose="02020603050405020304" pitchFamily="18" charset="0"/>
+              </a:rPr>
+              <a:t>)</a:t>
+            </a:r>
+          </a:p>
+          <a:p>
+            <a:pPr lvl="1" algn="just">
+              <a:buAutoNum type="arabicPeriod"/>
+            </a:pPr>
+            <a:r>
+              <a:rPr lang="pt-BR" sz="1400" dirty="0" err="1">
+                <a:solidFill>
+                  <a:schemeClr val="tx1"/>
+                </a:solidFill>
+                <a:latin typeface="Times New Roman" panose="02020603050405020304" pitchFamily="18" charset="0"/>
+                <a:cs typeface="Times New Roman" panose="02020603050405020304" pitchFamily="18" charset="0"/>
+              </a:rPr>
+              <a:t>Vendor</a:t>
+            </a:r>
+            <a:r>
+              <a:rPr lang="pt-BR" sz="1400" dirty="0">
+                <a:solidFill>
+                  <a:schemeClr val="tx1"/>
+                </a:solidFill>
+                <a:latin typeface="Times New Roman" panose="02020603050405020304" pitchFamily="18" charset="0"/>
+                <a:cs typeface="Times New Roman" panose="02020603050405020304" pitchFamily="18" charset="0"/>
+              </a:rPr>
+              <a:t> (</a:t>
+            </a:r>
+            <a:r>
+              <a:rPr lang="pt-BR" sz="1400" b="1" dirty="0">
+                <a:solidFill>
+                  <a:schemeClr val="tx1"/>
+                </a:solidFill>
+                <a:latin typeface="Times New Roman" panose="02020603050405020304" pitchFamily="18" charset="0"/>
+                <a:cs typeface="Times New Roman" panose="02020603050405020304" pitchFamily="18" charset="0"/>
+              </a:rPr>
+              <a:t>dependência do projeto com componentes de terceiros, se for o caso...</a:t>
+            </a:r>
+            <a:r>
+              <a:rPr lang="pt-BR" sz="1400" dirty="0">
+                <a:solidFill>
+                  <a:schemeClr val="tx1"/>
+                </a:solidFill>
+                <a:latin typeface="Times New Roman" panose="02020603050405020304" pitchFamily="18" charset="0"/>
+                <a:cs typeface="Times New Roman" panose="02020603050405020304" pitchFamily="18" charset="0"/>
+              </a:rPr>
+              <a:t>)</a:t>
+            </a:r>
+          </a:p>
+          <a:p>
+            <a:pPr lvl="1" algn="just">
+              <a:buAutoNum type="arabicPeriod"/>
+            </a:pPr>
+            <a:endParaRPr lang="pt-BR" sz="1400" dirty="0">
+              <a:solidFill>
+                <a:schemeClr val="tx1"/>
+              </a:solidFill>
+              <a:latin typeface="Times New Roman" panose="02020603050405020304" pitchFamily="18" charset="0"/>
+              <a:cs typeface="Times New Roman" panose="02020603050405020304" pitchFamily="18" charset="0"/>
+            </a:endParaRPr>
+          </a:p>
+          <a:p>
+            <a:pPr marL="0" indent="0" algn="just">
+              <a:buNone/>
+            </a:pPr>
+            <a:endParaRPr lang="pt-BR" sz="1400" dirty="0">
+              <a:solidFill>
+                <a:schemeClr val="tx1"/>
+              </a:solidFill>
+              <a:latin typeface="Times New Roman" panose="02020603050405020304" pitchFamily="18" charset="0"/>
+              <a:cs typeface="Times New Roman" panose="02020603050405020304" pitchFamily="18" charset="0"/>
+            </a:endParaRPr>
+          </a:p>
+          <a:p>
+            <a:pPr marL="0" indent="0" algn="just">
+              <a:buNone/>
+            </a:pPr>
+            <a:endParaRPr lang="pt-BR" sz="1400" dirty="0">
+              <a:solidFill>
+                <a:schemeClr val="tx1"/>
+              </a:solidFill>
+              <a:latin typeface="Times New Roman" panose="02020603050405020304" pitchFamily="18" charset="0"/>
+              <a:cs typeface="Times New Roman" panose="02020603050405020304" pitchFamily="18" charset="0"/>
+            </a:endParaRPr>
+          </a:p>
         </p:txBody>
       </p:sp>
-      <p:pic>
-        <p:nvPicPr>
-          <p:cNvPr id="3" name="Imagem 2">
-            <a:extLst>
-              <a:ext uri="{FF2B5EF4-FFF2-40B4-BE49-F238E27FC236}">
-                <a16:creationId xmlns:a16="http://schemas.microsoft.com/office/drawing/2014/main" id="{BAD3C19E-3333-D4B3-2803-660E4C8EE4C6}"/>
-              </a:ext>
-            </a:extLst>
-          </p:cNvPr>
-          <p:cNvPicPr>
-            <a:picLocks noChangeAspect="1"/>
-          </p:cNvPicPr>
-          <p:nvPr/>
-        </p:nvPicPr>
-        <p:blipFill>
-          <a:blip r:embed="rId3">
-            <a:extLst>
-              <a:ext uri="{28A0092B-C50C-407E-A947-70E740481C1C}">
-                <a14:useLocalDpi xmlns:a14="http://schemas.microsoft.com/office/drawing/2010/main" val="0"/>
-              </a:ext>
-            </a:extLst>
-          </a:blip>
-          <a:stretch>
-            <a:fillRect/>
-          </a:stretch>
-        </p:blipFill>
-        <p:spPr>
-          <a:xfrm>
-            <a:off x="1729114" y="1802964"/>
-            <a:ext cx="4659160" cy="3271325"/>
-          </a:xfrm>
-          <a:prstGeom prst="rect">
-            <a:avLst/>
-          </a:prstGeom>
-        </p:spPr>
-      </p:pic>
     </p:spTree>
     <p:extLst>
       <p:ext uri="{BB962C8B-B14F-4D97-AF65-F5344CB8AC3E}">
-        <p14:creationId xmlns:p14="http://schemas.microsoft.com/office/powerpoint/2010/main" val="2394332658"/>
+        <p14:creationId xmlns:p14="http://schemas.microsoft.com/office/powerpoint/2010/main" val="3439317978"/>
       </p:ext>
     </p:extLst>
   </p:cSld>
@@ -9092,8 +10526,8 @@
         </p:nvSpPr>
         <p:spPr>
           <a:xfrm>
-            <a:off x="142865" y="1037311"/>
-            <a:ext cx="8865056" cy="4023203"/>
+            <a:off x="142865" y="1037312"/>
+            <a:ext cx="8865056" cy="3900208"/>
           </a:xfrm>
         </p:spPr>
         <p:txBody>
@@ -9102,19 +10536,18 @@
           </a:bodyPr>
           <a:lstStyle/>
           <a:p>
-            <a:pPr algn="just">
-              <a:buFont typeface="Wingdings" panose="05000000000000000000" pitchFamily="2" charset="2"/>
-              <a:buChar char="§"/>
+            <a:pPr marL="0" indent="0" algn="just">
+              <a:buNone/>
             </a:pPr>
             <a:r>
-              <a:rPr lang="pt-BR" sz="2400" dirty="0" err="1">
-                <a:solidFill>
-                  <a:schemeClr val="tx1"/>
-                </a:solidFill>
-                <a:latin typeface="Times New Roman" panose="02020603050405020304" pitchFamily="18" charset="0"/>
-                <a:cs typeface="Times New Roman" panose="02020603050405020304" pitchFamily="18" charset="0"/>
-              </a:rPr>
-              <a:t>Class</a:t>
+              <a:rPr lang="pt-BR" sz="2400" b="1" dirty="0">
+                <a:solidFill>
+                  <a:srgbClr val="FF0000"/>
+                </a:solidFill>
+                <a:latin typeface="Times New Roman" panose="02020603050405020304" pitchFamily="18" charset="0"/>
+                <a:cs typeface="Times New Roman" panose="02020603050405020304" pitchFamily="18" charset="0"/>
+              </a:rPr>
+              <a:t>Orientação a objetos </a:t>
             </a:r>
             <a:r>
               <a:rPr lang="pt-BR" sz="2400" dirty="0">
@@ -9124,24 +10557,13 @@
                 <a:latin typeface="Times New Roman" panose="02020603050405020304" pitchFamily="18" charset="0"/>
                 <a:cs typeface="Times New Roman" panose="02020603050405020304" pitchFamily="18" charset="0"/>
               </a:rPr>
-              <a:t> (Abstração)</a:t>
-            </a:r>
-          </a:p>
-          <a:p>
-            <a:pPr lvl="1" algn="just">
-              <a:buFont typeface="Arial" panose="020B0604020202020204" pitchFamily="34" charset="0"/>
-              <a:buChar char="•"/>
+              <a:t>é um paradigma aplicado na programação que consiste na interação entre diversas unidades chamadas de objetos.</a:t>
+            </a:r>
+          </a:p>
+          <a:p>
+            <a:pPr marL="0" indent="0" algn="just">
+              <a:buNone/>
             </a:pPr>
-            <a:r>
-              <a:rPr lang="pt-BR" sz="2400" dirty="0" err="1">
-                <a:solidFill>
-                  <a:schemeClr val="tx1"/>
-                </a:solidFill>
-                <a:latin typeface="Times New Roman" panose="02020603050405020304" pitchFamily="18" charset="0"/>
-                <a:cs typeface="Times New Roman" panose="02020603050405020304" pitchFamily="18" charset="0"/>
-              </a:rPr>
-              <a:t>Constructor</a:t>
-            </a:r>
             <a:endParaRPr lang="pt-BR" sz="2400" dirty="0">
               <a:solidFill>
                 <a:schemeClr val="tx1"/>
@@ -9151,30 +10573,9 @@
             </a:endParaRPr>
           </a:p>
           <a:p>
-            <a:pPr lvl="1" algn="just">
-              <a:buFont typeface="Arial" panose="020B0604020202020204" pitchFamily="34" charset="0"/>
-              <a:buChar char="•"/>
+            <a:pPr marL="0" indent="0" algn="just">
+              <a:buNone/>
             </a:pPr>
-            <a:r>
-              <a:rPr lang="pt-BR" sz="2400" dirty="0">
-                <a:solidFill>
-                  <a:schemeClr val="tx1"/>
-                </a:solidFill>
-                <a:latin typeface="Times New Roman" panose="02020603050405020304" pitchFamily="18" charset="0"/>
-                <a:cs typeface="Times New Roman" panose="02020603050405020304" pitchFamily="18" charset="0"/>
-              </a:rPr>
-              <a:t>Atributes/</a:t>
-            </a:r>
-            <a:r>
-              <a:rPr lang="pt-BR" sz="2400" dirty="0" err="1">
-                <a:solidFill>
-                  <a:schemeClr val="tx1"/>
-                </a:solidFill>
-                <a:latin typeface="Times New Roman" panose="02020603050405020304" pitchFamily="18" charset="0"/>
-                <a:cs typeface="Times New Roman" panose="02020603050405020304" pitchFamily="18" charset="0"/>
-              </a:rPr>
-              <a:t>Properties</a:t>
-            </a:r>
             <a:endParaRPr lang="pt-BR" sz="2400" dirty="0">
               <a:solidFill>
                 <a:schemeClr val="tx1"/>
@@ -9183,176 +10584,48 @@
               <a:cs typeface="Times New Roman" panose="02020603050405020304" pitchFamily="18" charset="0"/>
             </a:endParaRPr>
           </a:p>
-          <a:p>
-            <a:pPr lvl="1" algn="just">
-              <a:buFont typeface="Arial" panose="020B0604020202020204" pitchFamily="34" charset="0"/>
-              <a:buChar char="•"/>
-            </a:pPr>
-            <a:r>
-              <a:rPr lang="pt-BR" sz="2400" dirty="0" err="1">
-                <a:solidFill>
-                  <a:schemeClr val="tx1"/>
-                </a:solidFill>
-                <a:latin typeface="Times New Roman" panose="02020603050405020304" pitchFamily="18" charset="0"/>
-                <a:cs typeface="Times New Roman" panose="02020603050405020304" pitchFamily="18" charset="0"/>
-              </a:rPr>
-              <a:t>Methods</a:t>
-            </a:r>
-            <a:endParaRPr lang="pt-BR" sz="2400" dirty="0">
-              <a:solidFill>
-                <a:schemeClr val="tx1"/>
-              </a:solidFill>
-              <a:latin typeface="Times New Roman" panose="02020603050405020304" pitchFamily="18" charset="0"/>
-              <a:cs typeface="Times New Roman" panose="02020603050405020304" pitchFamily="18" charset="0"/>
-            </a:endParaRPr>
-          </a:p>
-          <a:p>
-            <a:pPr lvl="1" algn="just">
-              <a:buFont typeface="Arial" panose="020B0604020202020204" pitchFamily="34" charset="0"/>
-              <a:buChar char="•"/>
-            </a:pPr>
-            <a:r>
-              <a:rPr lang="pt-BR" sz="2400" dirty="0">
-                <a:solidFill>
-                  <a:schemeClr val="tx1"/>
-                </a:solidFill>
-                <a:latin typeface="Times New Roman" panose="02020603050405020304" pitchFamily="18" charset="0"/>
-                <a:cs typeface="Times New Roman" panose="02020603050405020304" pitchFamily="18" charset="0"/>
-              </a:rPr>
-              <a:t>Níveis de Visibilidade: </a:t>
-            </a:r>
-            <a:r>
-              <a:rPr lang="pt-BR" sz="2400" dirty="0" err="1">
-                <a:solidFill>
-                  <a:schemeClr val="tx1"/>
-                </a:solidFill>
-                <a:latin typeface="Times New Roman" panose="02020603050405020304" pitchFamily="18" charset="0"/>
-                <a:cs typeface="Times New Roman" panose="02020603050405020304" pitchFamily="18" charset="0"/>
-              </a:rPr>
-              <a:t>Public</a:t>
-            </a:r>
-            <a:r>
-              <a:rPr lang="pt-BR" sz="2400" dirty="0">
-                <a:solidFill>
-                  <a:schemeClr val="tx1"/>
-                </a:solidFill>
-                <a:latin typeface="Times New Roman" panose="02020603050405020304" pitchFamily="18" charset="0"/>
-                <a:cs typeface="Times New Roman" panose="02020603050405020304" pitchFamily="18" charset="0"/>
-              </a:rPr>
-              <a:t>; Private; </a:t>
-            </a:r>
-            <a:r>
-              <a:rPr lang="pt-BR" sz="2400" dirty="0" err="1">
-                <a:solidFill>
-                  <a:schemeClr val="tx1"/>
-                </a:solidFill>
-                <a:latin typeface="Times New Roman" panose="02020603050405020304" pitchFamily="18" charset="0"/>
-                <a:cs typeface="Times New Roman" panose="02020603050405020304" pitchFamily="18" charset="0"/>
-              </a:rPr>
-              <a:t>Protected</a:t>
-            </a:r>
-            <a:endParaRPr lang="pt-BR" sz="2400" dirty="0">
-              <a:solidFill>
-                <a:schemeClr val="tx1"/>
-              </a:solidFill>
-              <a:latin typeface="Times New Roman" panose="02020603050405020304" pitchFamily="18" charset="0"/>
-              <a:cs typeface="Times New Roman" panose="02020603050405020304" pitchFamily="18" charset="0"/>
-            </a:endParaRPr>
-          </a:p>
-          <a:p>
-            <a:pPr algn="just">
-              <a:buFont typeface="Wingdings" panose="05000000000000000000" pitchFamily="2" charset="2"/>
-              <a:buChar char="§"/>
-            </a:pPr>
-            <a:r>
-              <a:rPr lang="pt-BR" sz="2400" dirty="0" err="1">
-                <a:solidFill>
-                  <a:schemeClr val="tx1"/>
-                </a:solidFill>
-                <a:latin typeface="Times New Roman" panose="02020603050405020304" pitchFamily="18" charset="0"/>
-                <a:cs typeface="Times New Roman" panose="02020603050405020304" pitchFamily="18" charset="0"/>
-              </a:rPr>
-              <a:t>Object</a:t>
-            </a:r>
-            <a:endParaRPr lang="pt-BR" sz="2400" dirty="0">
-              <a:solidFill>
-                <a:schemeClr val="tx1"/>
-              </a:solidFill>
-              <a:latin typeface="Times New Roman" panose="02020603050405020304" pitchFamily="18" charset="0"/>
-              <a:cs typeface="Times New Roman" panose="02020603050405020304" pitchFamily="18" charset="0"/>
-            </a:endParaRPr>
-          </a:p>
-          <a:p>
-            <a:pPr algn="just">
-              <a:buFont typeface="Wingdings" panose="05000000000000000000" pitchFamily="2" charset="2"/>
-              <a:buChar char="§"/>
-            </a:pPr>
-            <a:r>
-              <a:rPr lang="pt-BR" sz="2400" dirty="0">
-                <a:solidFill>
-                  <a:schemeClr val="tx1"/>
-                </a:solidFill>
-                <a:latin typeface="Times New Roman" panose="02020603050405020304" pitchFamily="18" charset="0"/>
-                <a:cs typeface="Times New Roman" panose="02020603050405020304" pitchFamily="18" charset="0"/>
-              </a:rPr>
-              <a:t>Herança / </a:t>
-            </a:r>
-            <a:r>
-              <a:rPr lang="pt-BR" sz="2400" dirty="0" err="1">
-                <a:solidFill>
-                  <a:schemeClr val="tx1"/>
-                </a:solidFill>
-                <a:latin typeface="Times New Roman" panose="02020603050405020304" pitchFamily="18" charset="0"/>
-                <a:cs typeface="Times New Roman" panose="02020603050405020304" pitchFamily="18" charset="0"/>
-              </a:rPr>
-              <a:t>Extends</a:t>
-            </a:r>
-            <a:endParaRPr lang="pt-BR" sz="2400" dirty="0">
-              <a:solidFill>
-                <a:schemeClr val="tx1"/>
-              </a:solidFill>
-              <a:latin typeface="Times New Roman" panose="02020603050405020304" pitchFamily="18" charset="0"/>
-              <a:cs typeface="Times New Roman" panose="02020603050405020304" pitchFamily="18" charset="0"/>
-            </a:endParaRPr>
-          </a:p>
-          <a:p>
-            <a:pPr algn="just">
-              <a:buFont typeface="Wingdings" panose="05000000000000000000" pitchFamily="2" charset="2"/>
-              <a:buChar char="§"/>
-            </a:pPr>
-            <a:r>
-              <a:rPr lang="pt-BR" sz="2400" dirty="0">
-                <a:solidFill>
-                  <a:schemeClr val="tx1"/>
-                </a:solidFill>
-                <a:latin typeface="Times New Roman" panose="02020603050405020304" pitchFamily="18" charset="0"/>
-                <a:cs typeface="Times New Roman" panose="02020603050405020304" pitchFamily="18" charset="0"/>
-              </a:rPr>
-              <a:t>Encapsulamento</a:t>
-            </a:r>
-          </a:p>
-          <a:p>
-            <a:pPr algn="just">
-              <a:buFont typeface="Wingdings" panose="05000000000000000000" pitchFamily="2" charset="2"/>
-              <a:buChar char="§"/>
-            </a:pPr>
-            <a:r>
-              <a:rPr lang="pt-BR" sz="2400" dirty="0">
-                <a:solidFill>
-                  <a:schemeClr val="tx1"/>
-                </a:solidFill>
-                <a:latin typeface="Times New Roman" panose="02020603050405020304" pitchFamily="18" charset="0"/>
-                <a:cs typeface="Times New Roman" panose="02020603050405020304" pitchFamily="18" charset="0"/>
-              </a:rPr>
-              <a:t>Polimorfismo</a:t>
-            </a:r>
-          </a:p>
         </p:txBody>
       </p:sp>
+      <p:pic>
+        <p:nvPicPr>
+          <p:cNvPr id="3" name="Imagem 2">
+            <a:extLst>
+              <a:ext uri="{FF2B5EF4-FFF2-40B4-BE49-F238E27FC236}">
+                <a16:creationId xmlns:a16="http://schemas.microsoft.com/office/drawing/2014/main" id="{BAD3C19E-3333-D4B3-2803-660E4C8EE4C6}"/>
+              </a:ext>
+            </a:extLst>
+          </p:cNvPr>
+          <p:cNvPicPr>
+            <a:picLocks noChangeAspect="1"/>
+          </p:cNvPicPr>
+          <p:nvPr/>
+        </p:nvPicPr>
+        <p:blipFill>
+          <a:blip r:embed="rId3">
+            <a:extLst>
+              <a:ext uri="{28A0092B-C50C-407E-A947-70E740481C1C}">
+                <a14:useLocalDpi xmlns:a14="http://schemas.microsoft.com/office/drawing/2010/main" val="0"/>
+              </a:ext>
+            </a:extLst>
+          </a:blip>
+          <a:stretch>
+            <a:fillRect/>
+          </a:stretch>
+        </p:blipFill>
+        <p:spPr>
+          <a:xfrm>
+            <a:off x="1729114" y="1802964"/>
+            <a:ext cx="4659160" cy="3271325"/>
+          </a:xfrm>
+          <a:prstGeom prst="rect">
+            <a:avLst/>
+          </a:prstGeom>
+        </p:spPr>
+      </p:pic>
     </p:spTree>
     <p:extLst>
       <p:ext uri="{BB962C8B-B14F-4D97-AF65-F5344CB8AC3E}">
-        <p14:creationId xmlns:p14="http://schemas.microsoft.com/office/powerpoint/2010/main" val="1226275766"/>
+        <p14:creationId xmlns:p14="http://schemas.microsoft.com/office/powerpoint/2010/main" val="2394332658"/>
       </p:ext>
     </p:extLst>
   </p:cSld>

</xml_diff>